<commit_message>
Fixes for SQL part 3
</commit_message>
<xml_diff>
--- a/sql_course/3_python/3_python.pptx
+++ b/sql_course/3_python/3_python.pptx
@@ -262,7 +262,7 @@
           <a:p>
             <a:fld id="{685BAE75-55A4-4394-9868-AE29E61D43AE}" type="datetimeFigureOut">
               <a:rPr lang="nl-NL" smtClean="0"/>
-              <a:t>5-2-2025</a:t>
+              <a:t>6-2-2025</a:t>
             </a:fld>
             <a:endParaRPr lang="nl-NL"/>
           </a:p>
@@ -974,7 +974,7 @@
           <a:p>
             <a:fld id="{74C49272-0111-4310-A9F0-C1CA0D6AA5E5}" type="datetimeFigureOut">
               <a:rPr lang="en-NL" smtClean="0"/>
-              <a:t>05/02/2025</a:t>
+              <a:t>06/02/2025</a:t>
             </a:fld>
             <a:endParaRPr lang="en-NL"/>
           </a:p>
@@ -1174,7 +1174,7 @@
           <a:p>
             <a:fld id="{74C49272-0111-4310-A9F0-C1CA0D6AA5E5}" type="datetimeFigureOut">
               <a:rPr lang="en-NL" smtClean="0"/>
-              <a:t>05/02/2025</a:t>
+              <a:t>06/02/2025</a:t>
             </a:fld>
             <a:endParaRPr lang="en-NL"/>
           </a:p>
@@ -1384,7 +1384,7 @@
           <a:p>
             <a:fld id="{74C49272-0111-4310-A9F0-C1CA0D6AA5E5}" type="datetimeFigureOut">
               <a:rPr lang="en-NL" smtClean="0"/>
-              <a:t>05/02/2025</a:t>
+              <a:t>06/02/2025</a:t>
             </a:fld>
             <a:endParaRPr lang="en-NL"/>
           </a:p>
@@ -1584,7 +1584,7 @@
           <a:p>
             <a:fld id="{74C49272-0111-4310-A9F0-C1CA0D6AA5E5}" type="datetimeFigureOut">
               <a:rPr lang="en-NL" smtClean="0"/>
-              <a:t>05/02/2025</a:t>
+              <a:t>06/02/2025</a:t>
             </a:fld>
             <a:endParaRPr lang="en-NL"/>
           </a:p>
@@ -1860,7 +1860,7 @@
           <a:p>
             <a:fld id="{74C49272-0111-4310-A9F0-C1CA0D6AA5E5}" type="datetimeFigureOut">
               <a:rPr lang="en-NL" smtClean="0"/>
-              <a:t>05/02/2025</a:t>
+              <a:t>06/02/2025</a:t>
             </a:fld>
             <a:endParaRPr lang="en-NL"/>
           </a:p>
@@ -2128,7 +2128,7 @@
           <a:p>
             <a:fld id="{74C49272-0111-4310-A9F0-C1CA0D6AA5E5}" type="datetimeFigureOut">
               <a:rPr lang="en-NL" smtClean="0"/>
-              <a:t>05/02/2025</a:t>
+              <a:t>06/02/2025</a:t>
             </a:fld>
             <a:endParaRPr lang="en-NL"/>
           </a:p>
@@ -2543,7 +2543,7 @@
           <a:p>
             <a:fld id="{74C49272-0111-4310-A9F0-C1CA0D6AA5E5}" type="datetimeFigureOut">
               <a:rPr lang="en-NL" smtClean="0"/>
-              <a:t>05/02/2025</a:t>
+              <a:t>06/02/2025</a:t>
             </a:fld>
             <a:endParaRPr lang="en-NL"/>
           </a:p>
@@ -2685,7 +2685,7 @@
           <a:p>
             <a:fld id="{74C49272-0111-4310-A9F0-C1CA0D6AA5E5}" type="datetimeFigureOut">
               <a:rPr lang="en-NL" smtClean="0"/>
-              <a:t>05/02/2025</a:t>
+              <a:t>06/02/2025</a:t>
             </a:fld>
             <a:endParaRPr lang="en-NL"/>
           </a:p>
@@ -2798,7 +2798,7 @@
           <a:p>
             <a:fld id="{74C49272-0111-4310-A9F0-C1CA0D6AA5E5}" type="datetimeFigureOut">
               <a:rPr lang="en-NL" smtClean="0"/>
-              <a:t>05/02/2025</a:t>
+              <a:t>06/02/2025</a:t>
             </a:fld>
             <a:endParaRPr lang="en-NL"/>
           </a:p>
@@ -3111,7 +3111,7 @@
           <a:p>
             <a:fld id="{74C49272-0111-4310-A9F0-C1CA0D6AA5E5}" type="datetimeFigureOut">
               <a:rPr lang="en-NL" smtClean="0"/>
-              <a:t>05/02/2025</a:t>
+              <a:t>06/02/2025</a:t>
             </a:fld>
             <a:endParaRPr lang="en-NL"/>
           </a:p>
@@ -3400,7 +3400,7 @@
           <a:p>
             <a:fld id="{74C49272-0111-4310-A9F0-C1CA0D6AA5E5}" type="datetimeFigureOut">
               <a:rPr lang="en-NL" smtClean="0"/>
-              <a:t>05/02/2025</a:t>
+              <a:t>06/02/2025</a:t>
             </a:fld>
             <a:endParaRPr lang="en-NL"/>
           </a:p>
@@ -3643,7 +3643,7 @@
           <a:p>
             <a:fld id="{74C49272-0111-4310-A9F0-C1CA0D6AA5E5}" type="datetimeFigureOut">
               <a:rPr lang="en-NL" smtClean="0"/>
-              <a:t>05/02/2025</a:t>
+              <a:t>06/02/2025</a:t>
             </a:fld>
             <a:endParaRPr lang="en-NL"/>
           </a:p>
@@ -26197,21 +26197,21 @@
               <a:buNone/>
             </a:pPr>
             <a:r>
-              <a:rPr lang="nl-NL" sz="1600" b="1" noProof="0" dirty="0">
+              <a:rPr lang="en-US" sz="1600" b="1" noProof="0">
                 <a:latin typeface="Courier New" panose="02070309020205020404" pitchFamily="49" charset="0"/>
                 <a:cs typeface="Courier New" panose="02070309020205020404" pitchFamily="49" charset="0"/>
               </a:rPr>
               <a:t>class </a:t>
             </a:r>
             <a:r>
-              <a:rPr lang="nl-NL" sz="1600" b="1" noProof="0" dirty="0" err="1">
+              <a:rPr lang="en-US" sz="1600" b="1" noProof="0" dirty="0" err="1">
                 <a:latin typeface="Courier New" panose="02070309020205020404" pitchFamily="49" charset="0"/>
                 <a:cs typeface="Courier New" panose="02070309020205020404" pitchFamily="49" charset="0"/>
               </a:rPr>
               <a:t>TaskList</a:t>
             </a:r>
             <a:r>
-              <a:rPr lang="nl-NL" sz="1600" b="1" noProof="0" dirty="0">
+              <a:rPr lang="en-US" sz="1600" b="1" noProof="0" dirty="0">
                 <a:latin typeface="Courier New" panose="02070309020205020404" pitchFamily="49" charset="0"/>
                 <a:cs typeface="Courier New" panose="02070309020205020404" pitchFamily="49" charset="0"/>
               </a:rPr>
@@ -26224,7 +26224,7 @@
               <a:buNone/>
             </a:pPr>
             <a:r>
-              <a:rPr lang="nl-NL" sz="1600" noProof="0" dirty="0">
+              <a:rPr lang="en-US" sz="1600" noProof="0" dirty="0">
                 <a:latin typeface="Courier New" panose="02070309020205020404" pitchFamily="49" charset="0"/>
                 <a:cs typeface="Courier New" panose="02070309020205020404" pitchFamily="49" charset="0"/>
               </a:rPr>
@@ -26237,25 +26237,11 @@
               <a:buNone/>
             </a:pPr>
             <a:r>
-              <a:rPr lang="nl-NL" sz="1600" dirty="0">
-                <a:latin typeface="Courier New" panose="02070309020205020404" pitchFamily="49" charset="0"/>
-                <a:cs typeface="Courier New" panose="02070309020205020404" pitchFamily="49" charset="0"/>
-              </a:rPr>
-              <a:t>  </a:t>
-            </a:r>
-            <a:r>
-              <a:rPr lang="nl-NL" sz="1600" dirty="0" err="1">
-                <a:latin typeface="Courier New" panose="02070309020205020404" pitchFamily="49" charset="0"/>
-                <a:cs typeface="Courier New" panose="02070309020205020404" pitchFamily="49" charset="0"/>
-              </a:rPr>
-              <a:t>tasks</a:t>
-            </a:r>
-            <a:r>
-              <a:rPr lang="nl-NL" sz="1600" dirty="0">
-                <a:latin typeface="Courier New" panose="02070309020205020404" pitchFamily="49" charset="0"/>
-                <a:cs typeface="Courier New" panose="02070309020205020404" pitchFamily="49" charset="0"/>
-              </a:rPr>
-              <a:t> = {}</a:t>
+              <a:rPr lang="en-US" sz="1600" dirty="0">
+                <a:latin typeface="Courier New" panose="02070309020205020404" pitchFamily="49" charset="0"/>
+                <a:cs typeface="Courier New" panose="02070309020205020404" pitchFamily="49" charset="0"/>
+              </a:rPr>
+              <a:t>  tasks = []</a:t>
             </a:r>
           </a:p>
           <a:p>
@@ -26263,7 +26249,7 @@
               <a:buFont typeface="Arial" panose="020B0604020202020204" pitchFamily="34" charset="0"/>
               <a:buNone/>
             </a:pPr>
-            <a:endParaRPr lang="nl-NL" sz="1600" noProof="0" dirty="0">
+            <a:endParaRPr lang="en-US" sz="1600" noProof="0" dirty="0">
               <a:latin typeface="Courier New" panose="02070309020205020404" pitchFamily="49" charset="0"/>
               <a:cs typeface="Courier New" panose="02070309020205020404" pitchFamily="49" charset="0"/>
             </a:endParaRPr>
@@ -26274,25 +26260,11 @@
               <a:buNone/>
             </a:pPr>
             <a:r>
-              <a:rPr lang="nl-NL" sz="1600" b="1" noProof="0" dirty="0">
-                <a:latin typeface="Courier New" panose="02070309020205020404" pitchFamily="49" charset="0"/>
-                <a:cs typeface="Courier New" panose="02070309020205020404" pitchFamily="49" charset="0"/>
-              </a:rPr>
-              <a:t>class </a:t>
-            </a:r>
-            <a:r>
-              <a:rPr lang="nl-NL" sz="1600" b="1" noProof="0" dirty="0" err="1">
-                <a:latin typeface="Courier New" panose="02070309020205020404" pitchFamily="49" charset="0"/>
-                <a:cs typeface="Courier New" panose="02070309020205020404" pitchFamily="49" charset="0"/>
-              </a:rPr>
-              <a:t>Task</a:t>
-            </a:r>
-            <a:r>
-              <a:rPr lang="nl-NL" sz="1600" b="1" noProof="0" dirty="0">
-                <a:latin typeface="Courier New" panose="02070309020205020404" pitchFamily="49" charset="0"/>
-                <a:cs typeface="Courier New" panose="02070309020205020404" pitchFamily="49" charset="0"/>
-              </a:rPr>
-              <a:t>:</a:t>
+              <a:rPr lang="en-US" sz="1600" b="1" noProof="0" dirty="0">
+                <a:latin typeface="Courier New" panose="02070309020205020404" pitchFamily="49" charset="0"/>
+                <a:cs typeface="Courier New" panose="02070309020205020404" pitchFamily="49" charset="0"/>
+              </a:rPr>
+              <a:t>class Task:</a:t>
             </a:r>
           </a:p>
           <a:p>
@@ -26301,25 +26273,11 @@
               <a:buNone/>
             </a:pPr>
             <a:r>
-              <a:rPr lang="nl-NL" sz="1600" noProof="0" dirty="0">
-                <a:latin typeface="Courier New" panose="02070309020205020404" pitchFamily="49" charset="0"/>
-                <a:cs typeface="Courier New" panose="02070309020205020404" pitchFamily="49" charset="0"/>
-              </a:rPr>
-              <a:t>  </a:t>
-            </a:r>
-            <a:r>
-              <a:rPr lang="nl-NL" sz="1600" noProof="0" dirty="0" err="1">
-                <a:latin typeface="Courier New" panose="02070309020205020404" pitchFamily="49" charset="0"/>
-                <a:cs typeface="Courier New" panose="02070309020205020404" pitchFamily="49" charset="0"/>
-              </a:rPr>
-              <a:t>description</a:t>
-            </a:r>
-            <a:r>
-              <a:rPr lang="nl-NL" sz="1600" noProof="0" dirty="0">
-                <a:latin typeface="Courier New" panose="02070309020205020404" pitchFamily="49" charset="0"/>
-                <a:cs typeface="Courier New" panose="02070309020205020404" pitchFamily="49" charset="0"/>
-              </a:rPr>
-              <a:t> = None</a:t>
+              <a:rPr lang="en-US" sz="1600" noProof="0" dirty="0">
+                <a:latin typeface="Courier New" panose="02070309020205020404" pitchFamily="49" charset="0"/>
+                <a:cs typeface="Courier New" panose="02070309020205020404" pitchFamily="49" charset="0"/>
+              </a:rPr>
+              <a:t>  description = None</a:t>
             </a:r>
           </a:p>
           <a:p>
@@ -26328,20 +26286,20 @@
               <a:buNone/>
             </a:pPr>
             <a:r>
-              <a:rPr lang="nl-NL" sz="1600" dirty="0">
+              <a:rPr lang="en-US" sz="1600" dirty="0">
                 <a:latin typeface="Courier New" panose="02070309020205020404" pitchFamily="49" charset="0"/>
                 <a:cs typeface="Courier New" panose="02070309020205020404" pitchFamily="49" charset="0"/>
               </a:rPr>
               <a:t>  state = </a:t>
             </a:r>
             <a:r>
-              <a:rPr lang="nl-NL" sz="1600" dirty="0" err="1">
-                <a:latin typeface="Courier New" panose="02070309020205020404" pitchFamily="49" charset="0"/>
-                <a:cs typeface="Courier New" panose="02070309020205020404" pitchFamily="49" charset="0"/>
-              </a:rPr>
-              <a:t>Status.NEW</a:t>
-            </a:r>
-            <a:endParaRPr lang="nl-NL" sz="1600" dirty="0">
+              <a:rPr lang="en-US" sz="1600" dirty="0" err="1">
+                <a:latin typeface="Courier New" panose="02070309020205020404" pitchFamily="49" charset="0"/>
+                <a:cs typeface="Courier New" panose="02070309020205020404" pitchFamily="49" charset="0"/>
+              </a:rPr>
+              <a:t>State.NEW</a:t>
+            </a:r>
+            <a:endParaRPr lang="en-US" sz="1600" dirty="0">
               <a:latin typeface="Courier New" panose="02070309020205020404" pitchFamily="49" charset="0"/>
               <a:cs typeface="Courier New" panose="02070309020205020404" pitchFamily="49" charset="0"/>
             </a:endParaRPr>
@@ -26352,35 +26310,21 @@
               <a:buNone/>
             </a:pPr>
             <a:r>
-              <a:rPr lang="nl-NL" sz="1600" dirty="0">
-                <a:latin typeface="Courier New" panose="02070309020205020404" pitchFamily="49" charset="0"/>
-                <a:cs typeface="Courier New" panose="02070309020205020404" pitchFamily="49" charset="0"/>
-              </a:rPr>
-              <a:t>  </a:t>
-            </a:r>
-            <a:r>
-              <a:rPr lang="nl-NL" sz="1600" dirty="0" err="1">
-                <a:latin typeface="Courier New" panose="02070309020205020404" pitchFamily="49" charset="0"/>
-                <a:cs typeface="Courier New" panose="02070309020205020404" pitchFamily="49" charset="0"/>
-              </a:rPr>
-              <a:t>updated</a:t>
-            </a:r>
-            <a:r>
-              <a:rPr lang="nl-NL" sz="1600" dirty="0">
-                <a:latin typeface="Courier New" panose="02070309020205020404" pitchFamily="49" charset="0"/>
-                <a:cs typeface="Courier New" panose="02070309020205020404" pitchFamily="49" charset="0"/>
-              </a:rPr>
-              <a:t> = </a:t>
-            </a:r>
-            <a:r>
-              <a:rPr lang="nl-NL" sz="1600" dirty="0" err="1">
+              <a:rPr lang="en-US" sz="1600" dirty="0">
+                <a:latin typeface="Courier New" panose="02070309020205020404" pitchFamily="49" charset="0"/>
+                <a:cs typeface="Courier New" panose="02070309020205020404" pitchFamily="49" charset="0"/>
+              </a:rPr>
+              <a:t>  updated = </a:t>
+            </a:r>
+            <a:r>
+              <a:rPr lang="en-US" sz="1600" dirty="0" err="1">
                 <a:latin typeface="Courier New" panose="02070309020205020404" pitchFamily="49" charset="0"/>
                 <a:cs typeface="Courier New" panose="02070309020205020404" pitchFamily="49" charset="0"/>
               </a:rPr>
               <a:t>dt.datetime.now</a:t>
             </a:r>
             <a:r>
-              <a:rPr lang="nl-NL" sz="1600" dirty="0">
+              <a:rPr lang="en-US" sz="1600" dirty="0">
                 <a:latin typeface="Courier New" panose="02070309020205020404" pitchFamily="49" charset="0"/>
                 <a:cs typeface="Courier New" panose="02070309020205020404" pitchFamily="49" charset="0"/>
               </a:rPr>
@@ -26392,7 +26336,7 @@
               <a:buFont typeface="Arial" panose="020B0604020202020204" pitchFamily="34" charset="0"/>
               <a:buNone/>
             </a:pPr>
-            <a:endParaRPr lang="nl-NL" sz="1600" noProof="0" dirty="0">
+            <a:endParaRPr lang="en-US" sz="1600" noProof="0" dirty="0">
               <a:latin typeface="Courier New" panose="02070309020205020404" pitchFamily="49" charset="0"/>
               <a:cs typeface="Courier New" panose="02070309020205020404" pitchFamily="49" charset="0"/>
             </a:endParaRPr>
@@ -26403,21 +26347,21 @@
               <a:buNone/>
             </a:pPr>
             <a:r>
-              <a:rPr lang="nl-NL" sz="1600" b="1" dirty="0">
+              <a:rPr lang="en-US" sz="1600" b="1" dirty="0">
                 <a:latin typeface="Courier New" panose="02070309020205020404" pitchFamily="49" charset="0"/>
                 <a:cs typeface="Courier New" panose="02070309020205020404" pitchFamily="49" charset="0"/>
               </a:rPr>
               <a:t>class State(</a:t>
             </a:r>
             <a:r>
-              <a:rPr lang="nl-NL" sz="1600" b="1" dirty="0" err="1">
+              <a:rPr lang="en-US" sz="1600" b="1" dirty="0" err="1">
                 <a:latin typeface="Courier New" panose="02070309020205020404" pitchFamily="49" charset="0"/>
                 <a:cs typeface="Courier New" panose="02070309020205020404" pitchFamily="49" charset="0"/>
               </a:rPr>
               <a:t>StrEnum</a:t>
             </a:r>
             <a:r>
-              <a:rPr lang="nl-NL" sz="1600" b="1" dirty="0">
+              <a:rPr lang="en-US" sz="1600" b="1" dirty="0">
                 <a:latin typeface="Courier New" panose="02070309020205020404" pitchFamily="49" charset="0"/>
                 <a:cs typeface="Courier New" panose="02070309020205020404" pitchFamily="49" charset="0"/>
               </a:rPr>
@@ -26430,14 +26374,14 @@
               <a:buNone/>
             </a:pPr>
             <a:r>
-              <a:rPr lang="nl-NL" sz="1600" noProof="0" dirty="0">
+              <a:rPr lang="en-US" sz="1600" noProof="0" dirty="0">
                 <a:latin typeface="Courier New" panose="02070309020205020404" pitchFamily="49" charset="0"/>
                 <a:cs typeface="Courier New" panose="02070309020205020404" pitchFamily="49" charset="0"/>
               </a:rPr>
               <a:t>  NEW = </a:t>
             </a:r>
             <a:r>
-              <a:rPr lang="nl-NL" sz="1600" noProof="0" dirty="0">
+              <a:rPr lang="en-US" sz="1600" noProof="0" dirty="0">
                 <a:solidFill>
                   <a:schemeClr val="accent2">
                     <a:lumMod val="75000"/>
@@ -26455,14 +26399,14 @@
               <a:buNone/>
             </a:pPr>
             <a:r>
-              <a:rPr lang="nl-NL" sz="1600" dirty="0">
+              <a:rPr lang="en-US" sz="1600" dirty="0">
                 <a:latin typeface="Courier New" panose="02070309020205020404" pitchFamily="49" charset="0"/>
                 <a:cs typeface="Courier New" panose="02070309020205020404" pitchFamily="49" charset="0"/>
               </a:rPr>
               <a:t>  DONE = </a:t>
             </a:r>
             <a:r>
-              <a:rPr lang="nl-NL" sz="1600" dirty="0">
+              <a:rPr lang="en-US" sz="1600" dirty="0">
                 <a:solidFill>
                   <a:schemeClr val="accent2">
                     <a:lumMod val="75000"/>
@@ -26471,33 +26415,9 @@
                 <a:latin typeface="Courier New" panose="02070309020205020404" pitchFamily="49" charset="0"/>
                 <a:cs typeface="Courier New" panose="02070309020205020404" pitchFamily="49" charset="0"/>
               </a:rPr>
-              <a:t>"</a:t>
-            </a:r>
-            <a:r>
-              <a:rPr lang="nl-NL" sz="1600" dirty="0" err="1">
-                <a:solidFill>
-                  <a:schemeClr val="accent2">
-                    <a:lumMod val="75000"/>
-                  </a:schemeClr>
-                </a:solidFill>
-                <a:latin typeface="Courier New" panose="02070309020205020404" pitchFamily="49" charset="0"/>
-                <a:cs typeface="Courier New" panose="02070309020205020404" pitchFamily="49" charset="0"/>
-              </a:rPr>
-              <a:t>Done</a:t>
-            </a:r>
-            <a:r>
-              <a:rPr lang="nl-NL" sz="1600" dirty="0">
-                <a:solidFill>
-                  <a:schemeClr val="accent2">
-                    <a:lumMod val="75000"/>
-                  </a:schemeClr>
-                </a:solidFill>
-                <a:latin typeface="Courier New" panose="02070309020205020404" pitchFamily="49" charset="0"/>
-                <a:cs typeface="Courier New" panose="02070309020205020404" pitchFamily="49" charset="0"/>
-              </a:rPr>
-              <a:t>"</a:t>
-            </a:r>
-            <a:endParaRPr lang="nl-NL" sz="1600" noProof="0" dirty="0">
+              <a:t>"Done"</a:t>
+            </a:r>
+            <a:endParaRPr lang="en-US" sz="1600" noProof="0" dirty="0">
               <a:solidFill>
                 <a:schemeClr val="accent2">
                   <a:lumMod val="75000"/>
@@ -26646,15 +26566,7 @@
             </a:pPr>
             <a:r>
               <a:rPr lang="nl-NL" sz="1800" noProof="0" dirty="0"/>
-              <a:t>Stel: je wilt een takenlijst bijhouden in Python en maakt de volgende </a:t>
-            </a:r>
-            <a:r>
-              <a:rPr lang="nl-NL" sz="1800" noProof="0" dirty="0" err="1"/>
-              <a:t>klasses</a:t>
-            </a:r>
-            <a:r>
-              <a:rPr lang="nl-NL" sz="1800" noProof="0" dirty="0"/>
-              <a:t>:</a:t>
+              <a:t>Stel: je wilt een takenlijst bijhouden in Python en maakt de volgende classes:</a:t>
             </a:r>
           </a:p>
           <a:p>
@@ -26669,7 +26581,7 @@
             </a:pPr>
             <a:r>
               <a:rPr lang="nl-NL" sz="1800" b="1" noProof="0" dirty="0" err="1"/>
-              <a:t>TaakLijst</a:t>
+              <a:t>TaskList</a:t>
             </a:r>
             <a:endParaRPr lang="nl-NL" sz="1800" noProof="0" dirty="0"/>
           </a:p>
@@ -26705,8 +26617,8 @@
               <a:buNone/>
             </a:pPr>
             <a:r>
-              <a:rPr lang="nl-NL" sz="1800" b="1" noProof="0" dirty="0"/>
-              <a:t>Taak</a:t>
+              <a:rPr lang="nl-NL" sz="1800" b="1" noProof="0" dirty="0" err="1"/>
+              <a:t>Task</a:t>
             </a:r>
             <a:endParaRPr lang="nl-NL" sz="1800" noProof="0" dirty="0"/>
           </a:p>
@@ -26731,7 +26643,7 @@
             </a:pPr>
             <a:r>
               <a:rPr lang="nl-NL" sz="1800" b="1" dirty="0"/>
-              <a:t>Status</a:t>
+              <a:t>State</a:t>
             </a:r>
           </a:p>
           <a:p>
@@ -26740,7 +26652,7 @@
             </a:pPr>
             <a:r>
               <a:rPr lang="nl-NL" sz="1800" noProof="0" dirty="0"/>
-              <a:t>Set standaardwaarden voor taak status.</a:t>
+              <a:t>Set standaardwaarden voor status taak.</a:t>
             </a:r>
           </a:p>
         </p:txBody>
@@ -26942,7 +26854,7 @@
               <a:buNone/>
             </a:pPr>
             <a:r>
-              <a:rPr lang="nl-NL" sz="1600" noProof="0" dirty="0">
+              <a:rPr lang="en-US" sz="1600" noProof="0" dirty="0">
                 <a:solidFill>
                   <a:schemeClr val="accent6">
                     <a:lumMod val="75000"/>
@@ -26951,10 +26863,10 @@
                 <a:latin typeface="Courier New" panose="02070309020205020404" pitchFamily="49" charset="0"/>
                 <a:cs typeface="Courier New" panose="02070309020205020404" pitchFamily="49" charset="0"/>
               </a:rPr>
-              <a:t># </a:t>
-            </a:r>
-            <a:r>
-              <a:rPr lang="nl-NL" sz="1600" noProof="0" dirty="0" err="1">
+              <a:t># Create a </a:t>
+            </a:r>
+            <a:r>
+              <a:rPr lang="en-US" sz="1600" noProof="0" dirty="0" err="1">
                 <a:solidFill>
                   <a:schemeClr val="accent6">
                     <a:lumMod val="75000"/>
@@ -26963,10 +26875,10 @@
                 <a:latin typeface="Courier New" panose="02070309020205020404" pitchFamily="49" charset="0"/>
                 <a:cs typeface="Courier New" panose="02070309020205020404" pitchFamily="49" charset="0"/>
               </a:rPr>
-              <a:t>Create</a:t>
-            </a:r>
-            <a:r>
-              <a:rPr lang="nl-NL" sz="1600" noProof="0" dirty="0">
+              <a:t>TaskList</a:t>
+            </a:r>
+            <a:r>
+              <a:rPr lang="en-US" sz="1600" noProof="0" dirty="0">
                 <a:solidFill>
                   <a:schemeClr val="accent6">
                     <a:lumMod val="75000"/>
@@ -26975,10 +26887,129 @@
                 <a:latin typeface="Courier New" panose="02070309020205020404" pitchFamily="49" charset="0"/>
                 <a:cs typeface="Courier New" panose="02070309020205020404" pitchFamily="49" charset="0"/>
               </a:rPr>
-              <a:t> a </a:t>
-            </a:r>
-            <a:r>
-              <a:rPr lang="nl-NL" sz="1600" noProof="0" dirty="0" err="1">
+              <a:t> and add a task.</a:t>
+            </a:r>
+          </a:p>
+          <a:p>
+            <a:pPr marL="0" indent="0">
+              <a:buFont typeface="Arial" panose="020B0604020202020204" pitchFamily="34" charset="0"/>
+              <a:buNone/>
+            </a:pPr>
+            <a:r>
+              <a:rPr lang="en-US" sz="1600" noProof="0" dirty="0" err="1">
+                <a:latin typeface="Courier New" panose="02070309020205020404" pitchFamily="49" charset="0"/>
+                <a:cs typeface="Courier New" panose="02070309020205020404" pitchFamily="49" charset="0"/>
+              </a:rPr>
+              <a:t>my_list</a:t>
+            </a:r>
+            <a:r>
+              <a:rPr lang="en-US" sz="1600" noProof="0" dirty="0">
+                <a:latin typeface="Courier New" panose="02070309020205020404" pitchFamily="49" charset="0"/>
+                <a:cs typeface="Courier New" panose="02070309020205020404" pitchFamily="49" charset="0"/>
+              </a:rPr>
+              <a:t> = </a:t>
+            </a:r>
+            <a:r>
+              <a:rPr lang="en-US" sz="1600" noProof="0" dirty="0" err="1">
+                <a:latin typeface="Courier New" panose="02070309020205020404" pitchFamily="49" charset="0"/>
+                <a:cs typeface="Courier New" panose="02070309020205020404" pitchFamily="49" charset="0"/>
+              </a:rPr>
+              <a:t>TaskList</a:t>
+            </a:r>
+            <a:r>
+              <a:rPr lang="en-US" sz="1600" dirty="0">
+                <a:latin typeface="Courier New" panose="02070309020205020404" pitchFamily="49" charset="0"/>
+                <a:cs typeface="Courier New" panose="02070309020205020404" pitchFamily="49" charset="0"/>
+              </a:rPr>
+              <a:t>(</a:t>
+            </a:r>
+            <a:r>
+              <a:rPr lang="en-US" sz="1600" dirty="0">
+                <a:solidFill>
+                  <a:schemeClr val="accent2">
+                    <a:lumMod val="75000"/>
+                  </a:schemeClr>
+                </a:solidFill>
+                <a:latin typeface="Courier New" panose="02070309020205020404" pitchFamily="49" charset="0"/>
+                <a:cs typeface="Courier New" panose="02070309020205020404" pitchFamily="49" charset="0"/>
+              </a:rPr>
+              <a:t>"House keeping"</a:t>
+            </a:r>
+            <a:r>
+              <a:rPr lang="en-US" sz="1600" dirty="0">
+                <a:latin typeface="Courier New" panose="02070309020205020404" pitchFamily="49" charset="0"/>
+                <a:cs typeface="Courier New" panose="02070309020205020404" pitchFamily="49" charset="0"/>
+              </a:rPr>
+              <a:t>)</a:t>
+            </a:r>
+            <a:endParaRPr lang="en-US" sz="1600" noProof="0" dirty="0">
+              <a:latin typeface="Courier New" panose="02070309020205020404" pitchFamily="49" charset="0"/>
+              <a:cs typeface="Courier New" panose="02070309020205020404" pitchFamily="49" charset="0"/>
+            </a:endParaRPr>
+          </a:p>
+          <a:p>
+            <a:pPr marL="0" indent="0">
+              <a:buFont typeface="Arial" panose="020B0604020202020204" pitchFamily="34" charset="0"/>
+              <a:buNone/>
+            </a:pPr>
+            <a:r>
+              <a:rPr lang="en-US" sz="1600" dirty="0" err="1">
+                <a:latin typeface="Courier New" panose="02070309020205020404" pitchFamily="49" charset="0"/>
+                <a:cs typeface="Courier New" panose="02070309020205020404" pitchFamily="49" charset="0"/>
+              </a:rPr>
+              <a:t>my_list.add</a:t>
+            </a:r>
+            <a:r>
+              <a:rPr lang="en-US" sz="1600" dirty="0">
+                <a:latin typeface="Courier New" panose="02070309020205020404" pitchFamily="49" charset="0"/>
+                <a:cs typeface="Courier New" panose="02070309020205020404" pitchFamily="49" charset="0"/>
+              </a:rPr>
+              <a:t>(</a:t>
+            </a:r>
+            <a:r>
+              <a:rPr lang="en-US" sz="1600" dirty="0">
+                <a:solidFill>
+                  <a:schemeClr val="accent2">
+                    <a:lumMod val="75000"/>
+                  </a:schemeClr>
+                </a:solidFill>
+                <a:latin typeface="Courier New" panose="02070309020205020404" pitchFamily="49" charset="0"/>
+                <a:cs typeface="Courier New" panose="02070309020205020404" pitchFamily="49" charset="0"/>
+              </a:rPr>
+              <a:t>"Do the dishes"</a:t>
+            </a:r>
+            <a:r>
+              <a:rPr lang="en-US" sz="1600" dirty="0">
+                <a:latin typeface="Courier New" panose="02070309020205020404" pitchFamily="49" charset="0"/>
+                <a:cs typeface="Courier New" panose="02070309020205020404" pitchFamily="49" charset="0"/>
+              </a:rPr>
+              <a:t>)</a:t>
+            </a:r>
+          </a:p>
+          <a:p>
+            <a:pPr marL="0" indent="0">
+              <a:buNone/>
+            </a:pPr>
+            <a:endParaRPr lang="en-US" sz="1600" noProof="0" dirty="0">
+              <a:latin typeface="Courier New" panose="02070309020205020404" pitchFamily="49" charset="0"/>
+              <a:cs typeface="Courier New" panose="02070309020205020404" pitchFamily="49" charset="0"/>
+            </a:endParaRPr>
+          </a:p>
+          <a:p>
+            <a:pPr marL="0" indent="0">
+              <a:buNone/>
+            </a:pPr>
+            <a:endParaRPr lang="en-US" sz="1600" noProof="0" dirty="0">
+              <a:latin typeface="Courier New" panose="02070309020205020404" pitchFamily="49" charset="0"/>
+              <a:cs typeface="Courier New" panose="02070309020205020404" pitchFamily="49" charset="0"/>
+            </a:endParaRPr>
+          </a:p>
+          <a:p>
+            <a:pPr marL="0" indent="0">
+              <a:buNone/>
+            </a:pPr>
+            <a:r>
+              <a:rPr lang="en-US" sz="1600" dirty="0">
                 <a:solidFill>
                   <a:schemeClr val="accent6">
                     <a:lumMod val="75000"/>
@@ -26987,128 +27018,41 @@
                 <a:latin typeface="Courier New" panose="02070309020205020404" pitchFamily="49" charset="0"/>
                 <a:cs typeface="Courier New" panose="02070309020205020404" pitchFamily="49" charset="0"/>
               </a:rPr>
-              <a:t>task</a:t>
-            </a:r>
-            <a:r>
-              <a:rPr lang="nl-NL" sz="1600" noProof="0" dirty="0">
-                <a:solidFill>
-                  <a:schemeClr val="accent6">
-                    <a:lumMod val="75000"/>
-                  </a:schemeClr>
-                </a:solidFill>
-                <a:latin typeface="Courier New" panose="02070309020205020404" pitchFamily="49" charset="0"/>
-                <a:cs typeface="Courier New" panose="02070309020205020404" pitchFamily="49" charset="0"/>
-              </a:rPr>
-              <a:t> list </a:t>
-            </a:r>
-            <a:r>
-              <a:rPr lang="nl-NL" sz="1600" noProof="0" dirty="0" err="1">
-                <a:solidFill>
-                  <a:schemeClr val="accent6">
-                    <a:lumMod val="75000"/>
-                  </a:schemeClr>
-                </a:solidFill>
-                <a:latin typeface="Courier New" panose="02070309020205020404" pitchFamily="49" charset="0"/>
-                <a:cs typeface="Courier New" panose="02070309020205020404" pitchFamily="49" charset="0"/>
-              </a:rPr>
-              <a:t>and</a:t>
-            </a:r>
-            <a:r>
-              <a:rPr lang="nl-NL" sz="1600" noProof="0" dirty="0">
-                <a:solidFill>
-                  <a:schemeClr val="accent6">
-                    <a:lumMod val="75000"/>
-                  </a:schemeClr>
-                </a:solidFill>
-                <a:latin typeface="Courier New" panose="02070309020205020404" pitchFamily="49" charset="0"/>
-                <a:cs typeface="Courier New" panose="02070309020205020404" pitchFamily="49" charset="0"/>
-              </a:rPr>
-              <a:t> </a:t>
-            </a:r>
-            <a:r>
-              <a:rPr lang="nl-NL" sz="1600" noProof="0" dirty="0" err="1">
-                <a:solidFill>
-                  <a:schemeClr val="accent6">
-                    <a:lumMod val="75000"/>
-                  </a:schemeClr>
-                </a:solidFill>
-                <a:latin typeface="Courier New" panose="02070309020205020404" pitchFamily="49" charset="0"/>
-                <a:cs typeface="Courier New" panose="02070309020205020404" pitchFamily="49" charset="0"/>
-              </a:rPr>
-              <a:t>add</a:t>
-            </a:r>
-            <a:r>
-              <a:rPr lang="nl-NL" sz="1600" noProof="0" dirty="0">
-                <a:solidFill>
-                  <a:schemeClr val="accent6">
-                    <a:lumMod val="75000"/>
-                  </a:schemeClr>
-                </a:solidFill>
-                <a:latin typeface="Courier New" panose="02070309020205020404" pitchFamily="49" charset="0"/>
-                <a:cs typeface="Courier New" panose="02070309020205020404" pitchFamily="49" charset="0"/>
-              </a:rPr>
-              <a:t> a </a:t>
-            </a:r>
-            <a:r>
-              <a:rPr lang="nl-NL" sz="1600" noProof="0" dirty="0" err="1">
-                <a:solidFill>
-                  <a:schemeClr val="accent6">
-                    <a:lumMod val="75000"/>
-                  </a:schemeClr>
-                </a:solidFill>
-                <a:latin typeface="Courier New" panose="02070309020205020404" pitchFamily="49" charset="0"/>
-                <a:cs typeface="Courier New" panose="02070309020205020404" pitchFamily="49" charset="0"/>
-              </a:rPr>
-              <a:t>task</a:t>
-            </a:r>
-            <a:r>
-              <a:rPr lang="nl-NL" sz="1600" noProof="0" dirty="0">
-                <a:solidFill>
-                  <a:schemeClr val="accent6">
-                    <a:lumMod val="75000"/>
-                  </a:schemeClr>
-                </a:solidFill>
-                <a:latin typeface="Courier New" panose="02070309020205020404" pitchFamily="49" charset="0"/>
-                <a:cs typeface="Courier New" panose="02070309020205020404" pitchFamily="49" charset="0"/>
-              </a:rPr>
-              <a:t>.</a:t>
-            </a:r>
-          </a:p>
-          <a:p>
-            <a:pPr marL="0" indent="0">
-              <a:buFont typeface="Arial" panose="020B0604020202020204" pitchFamily="34" charset="0"/>
-              <a:buNone/>
-            </a:pPr>
-            <a:r>
-              <a:rPr lang="nl-NL" sz="1600" noProof="0" dirty="0" err="1">
-                <a:latin typeface="Courier New" panose="02070309020205020404" pitchFamily="49" charset="0"/>
-                <a:cs typeface="Courier New" panose="02070309020205020404" pitchFamily="49" charset="0"/>
-              </a:rPr>
-              <a:t>my_list</a:t>
-            </a:r>
-            <a:r>
-              <a:rPr lang="nl-NL" sz="1600" noProof="0" dirty="0">
-                <a:latin typeface="Courier New" panose="02070309020205020404" pitchFamily="49" charset="0"/>
-                <a:cs typeface="Courier New" panose="02070309020205020404" pitchFamily="49" charset="0"/>
-              </a:rPr>
-              <a:t> = </a:t>
-            </a:r>
-            <a:r>
-              <a:rPr lang="nl-NL" sz="1600" noProof="0" dirty="0" err="1">
+              <a:t># Resulting object structure.</a:t>
+            </a:r>
+          </a:p>
+          <a:p>
+            <a:pPr marL="0" indent="0">
+              <a:buNone/>
+            </a:pPr>
+            <a:r>
+              <a:rPr lang="en-US" sz="1600" dirty="0" err="1">
                 <a:latin typeface="Courier New" panose="02070309020205020404" pitchFamily="49" charset="0"/>
                 <a:cs typeface="Courier New" panose="02070309020205020404" pitchFamily="49" charset="0"/>
               </a:rPr>
               <a:t>TaskList</a:t>
             </a:r>
             <a:r>
-              <a:rPr lang="nl-NL" sz="1600" dirty="0">
-                <a:latin typeface="Courier New" panose="02070309020205020404" pitchFamily="49" charset="0"/>
-                <a:cs typeface="Courier New" panose="02070309020205020404" pitchFamily="49" charset="0"/>
-              </a:rPr>
-              <a:t>(</a:t>
-            </a:r>
-            <a:r>
-              <a:rPr lang="nl-NL" sz="1600" dirty="0">
+              <a:rPr lang="en-US" sz="1600" dirty="0">
+                <a:latin typeface="Courier New" panose="02070309020205020404" pitchFamily="49" charset="0"/>
+                <a:cs typeface="Courier New" panose="02070309020205020404" pitchFamily="49" charset="0"/>
+              </a:rPr>
+              <a:t> {</a:t>
+            </a:r>
+          </a:p>
+          <a:p>
+            <a:pPr marL="0" indent="0">
+              <a:buNone/>
+            </a:pPr>
+            <a:r>
+              <a:rPr lang="en-US" sz="1600" dirty="0">
+                <a:latin typeface="Courier New" panose="02070309020205020404" pitchFamily="49" charset="0"/>
+                <a:cs typeface="Courier New" panose="02070309020205020404" pitchFamily="49" charset="0"/>
+              </a:rPr>
+              <a:t>  name = </a:t>
+            </a:r>
+            <a:r>
+              <a:rPr lang="en-US" sz="1600" dirty="0">
                 <a:solidFill>
                   <a:schemeClr val="accent2">
                     <a:lumMod val="75000"/>
@@ -27117,10 +27061,46 @@
                 <a:latin typeface="Courier New" panose="02070309020205020404" pitchFamily="49" charset="0"/>
                 <a:cs typeface="Courier New" panose="02070309020205020404" pitchFamily="49" charset="0"/>
               </a:rPr>
-              <a:t>"House </a:t>
-            </a:r>
-            <a:r>
-              <a:rPr lang="nl-NL" sz="1600" dirty="0" err="1">
+              <a:t>"House keeping"</a:t>
+            </a:r>
+          </a:p>
+          <a:p>
+            <a:pPr marL="0" indent="0">
+              <a:buNone/>
+            </a:pPr>
+            <a:r>
+              <a:rPr lang="en-US" sz="1600" dirty="0">
+                <a:latin typeface="Courier New" panose="02070309020205020404" pitchFamily="49" charset="0"/>
+                <a:cs typeface="Courier New" panose="02070309020205020404" pitchFamily="49" charset="0"/>
+              </a:rPr>
+              <a:t>  tasks = [</a:t>
+            </a:r>
+          </a:p>
+          <a:p>
+            <a:pPr marL="0" indent="0">
+              <a:buNone/>
+            </a:pPr>
+            <a:r>
+              <a:rPr lang="en-US" sz="1600" dirty="0">
+                <a:latin typeface="Courier New" panose="02070309020205020404" pitchFamily="49" charset="0"/>
+                <a:cs typeface="Courier New" panose="02070309020205020404" pitchFamily="49" charset="0"/>
+              </a:rPr>
+              <a:t>    Task {</a:t>
+            </a:r>
+          </a:p>
+          <a:p>
+            <a:pPr marL="0" indent="0">
+              <a:buNone/>
+            </a:pPr>
+            <a:r>
+              <a:rPr lang="en-US" sz="1600" dirty="0">
+                <a:latin typeface="Courier New" panose="02070309020205020404" pitchFamily="49" charset="0"/>
+                <a:cs typeface="Courier New" panose="02070309020205020404" pitchFamily="49" charset="0"/>
+              </a:rPr>
+              <a:t>       description = </a:t>
+            </a:r>
+            <a:r>
+              <a:rPr lang="en-US" sz="1600" dirty="0">
                 <a:solidFill>
                   <a:schemeClr val="accent2">
                     <a:lumMod val="75000"/>
@@ -27129,10 +27109,55 @@
                 <a:latin typeface="Courier New" panose="02070309020205020404" pitchFamily="49" charset="0"/>
                 <a:cs typeface="Courier New" panose="02070309020205020404" pitchFamily="49" charset="0"/>
               </a:rPr>
-              <a:t>keeping</a:t>
-            </a:r>
-            <a:r>
-              <a:rPr lang="nl-NL" sz="1600" dirty="0">
+              <a:t>"Do the dishes"</a:t>
+            </a:r>
+            <a:r>
+              <a:rPr lang="en-US" sz="1600" dirty="0">
+                <a:latin typeface="Courier New" panose="02070309020205020404" pitchFamily="49" charset="0"/>
+                <a:cs typeface="Courier New" panose="02070309020205020404" pitchFamily="49" charset="0"/>
+              </a:rPr>
+              <a:t>,</a:t>
+            </a:r>
+          </a:p>
+          <a:p>
+            <a:pPr marL="0" indent="0">
+              <a:buNone/>
+            </a:pPr>
+            <a:r>
+              <a:rPr lang="en-US" sz="1600" dirty="0">
+                <a:latin typeface="Courier New" panose="02070309020205020404" pitchFamily="49" charset="0"/>
+                <a:cs typeface="Courier New" panose="02070309020205020404" pitchFamily="49" charset="0"/>
+              </a:rPr>
+              <a:t>       state = </a:t>
+            </a:r>
+            <a:r>
+              <a:rPr lang="en-US" sz="1600" dirty="0" err="1">
+                <a:latin typeface="Courier New" panose="02070309020205020404" pitchFamily="49" charset="0"/>
+                <a:cs typeface="Courier New" panose="02070309020205020404" pitchFamily="49" charset="0"/>
+              </a:rPr>
+              <a:t>State.NEW</a:t>
+            </a:r>
+            <a:r>
+              <a:rPr lang="en-US" sz="1600" dirty="0">
+                <a:latin typeface="Courier New" panose="02070309020205020404" pitchFamily="49" charset="0"/>
+                <a:cs typeface="Courier New" panose="02070309020205020404" pitchFamily="49" charset="0"/>
+              </a:rPr>
+              <a:t>,</a:t>
+            </a:r>
+          </a:p>
+          <a:p>
+            <a:pPr marL="0" indent="0">
+              <a:buNone/>
+            </a:pPr>
+            <a:r>
+              <a:rPr lang="en-US" sz="1600" dirty="0">
+                <a:latin typeface="Courier New" panose="02070309020205020404" pitchFamily="49" charset="0"/>
+                <a:cs typeface="Courier New" panose="02070309020205020404" pitchFamily="49" charset="0"/>
+              </a:rPr>
+              <a:t>       updated = </a:t>
+            </a:r>
+            <a:r>
+              <a:rPr lang="en-US" sz="1600" dirty="0">
                 <a:solidFill>
                   <a:schemeClr val="accent2">
                     <a:lumMod val="75000"/>
@@ -27141,475 +27166,66 @@
                 <a:latin typeface="Courier New" panose="02070309020205020404" pitchFamily="49" charset="0"/>
                 <a:cs typeface="Courier New" panose="02070309020205020404" pitchFamily="49" charset="0"/>
               </a:rPr>
-              <a:t>"</a:t>
-            </a:r>
-            <a:r>
-              <a:rPr lang="nl-NL" sz="1600" dirty="0">
-                <a:latin typeface="Courier New" panose="02070309020205020404" pitchFamily="49" charset="0"/>
-                <a:cs typeface="Courier New" panose="02070309020205020404" pitchFamily="49" charset="0"/>
-              </a:rPr>
-              <a:t>)</a:t>
-            </a:r>
-            <a:endParaRPr lang="nl-NL" sz="1600" noProof="0" dirty="0">
+              <a:t>"2025-01-01 15:05:07"</a:t>
+            </a:r>
+            <a:r>
+              <a:rPr lang="en-US" sz="1600" dirty="0">
+                <a:latin typeface="Courier New" panose="02070309020205020404" pitchFamily="49" charset="0"/>
+                <a:cs typeface="Courier New" panose="02070309020205020404" pitchFamily="49" charset="0"/>
+              </a:rPr>
+              <a:t>,</a:t>
+            </a:r>
+          </a:p>
+          <a:p>
+            <a:pPr marL="0" indent="0">
+              <a:buNone/>
+            </a:pPr>
+            <a:r>
+              <a:rPr lang="en-US" sz="1600" dirty="0">
+                <a:latin typeface="Courier New" panose="02070309020205020404" pitchFamily="49" charset="0"/>
+                <a:cs typeface="Courier New" panose="02070309020205020404" pitchFamily="49" charset="0"/>
+              </a:rPr>
+              <a:t>    }</a:t>
+            </a:r>
+          </a:p>
+          <a:p>
+            <a:pPr marL="0" indent="0">
+              <a:buNone/>
+            </a:pPr>
+            <a:r>
+              <a:rPr lang="en-US" sz="1600" dirty="0">
+                <a:latin typeface="Courier New" panose="02070309020205020404" pitchFamily="49" charset="0"/>
+                <a:cs typeface="Courier New" panose="02070309020205020404" pitchFamily="49" charset="0"/>
+              </a:rPr>
+              <a:t>  ]</a:t>
+            </a:r>
+            <a:endParaRPr lang="en-US" sz="1600" noProof="0" dirty="0">
               <a:latin typeface="Courier New" panose="02070309020205020404" pitchFamily="49" charset="0"/>
               <a:cs typeface="Courier New" panose="02070309020205020404" pitchFamily="49" charset="0"/>
             </a:endParaRPr>
           </a:p>
           <a:p>
             <a:pPr marL="0" indent="0">
-              <a:buFont typeface="Arial" panose="020B0604020202020204" pitchFamily="34" charset="0"/>
-              <a:buNone/>
-            </a:pPr>
-            <a:r>
-              <a:rPr lang="nl-NL" sz="1600" dirty="0" err="1">
-                <a:latin typeface="Courier New" panose="02070309020205020404" pitchFamily="49" charset="0"/>
-                <a:cs typeface="Courier New" panose="02070309020205020404" pitchFamily="49" charset="0"/>
-              </a:rPr>
-              <a:t>my_list.add</a:t>
-            </a:r>
-            <a:r>
-              <a:rPr lang="nl-NL" sz="1600" dirty="0">
-                <a:latin typeface="Courier New" panose="02070309020205020404" pitchFamily="49" charset="0"/>
-                <a:cs typeface="Courier New" panose="02070309020205020404" pitchFamily="49" charset="0"/>
-              </a:rPr>
-              <a:t>(</a:t>
-            </a:r>
-            <a:r>
-              <a:rPr lang="nl-NL" sz="1600" dirty="0">
-                <a:solidFill>
-                  <a:schemeClr val="accent2">
-                    <a:lumMod val="75000"/>
-                  </a:schemeClr>
-                </a:solidFill>
-                <a:latin typeface="Courier New" panose="02070309020205020404" pitchFamily="49" charset="0"/>
-                <a:cs typeface="Courier New" panose="02070309020205020404" pitchFamily="49" charset="0"/>
-              </a:rPr>
-              <a:t>"Do </a:t>
-            </a:r>
-            <a:r>
-              <a:rPr lang="nl-NL" sz="1600" dirty="0" err="1">
-                <a:solidFill>
-                  <a:schemeClr val="accent2">
-                    <a:lumMod val="75000"/>
-                  </a:schemeClr>
-                </a:solidFill>
-                <a:latin typeface="Courier New" panose="02070309020205020404" pitchFamily="49" charset="0"/>
-                <a:cs typeface="Courier New" panose="02070309020205020404" pitchFamily="49" charset="0"/>
-              </a:rPr>
-              <a:t>the</a:t>
-            </a:r>
-            <a:r>
-              <a:rPr lang="nl-NL" sz="1600" dirty="0">
-                <a:solidFill>
-                  <a:schemeClr val="accent2">
-                    <a:lumMod val="75000"/>
-                  </a:schemeClr>
-                </a:solidFill>
-                <a:latin typeface="Courier New" panose="02070309020205020404" pitchFamily="49" charset="0"/>
-                <a:cs typeface="Courier New" panose="02070309020205020404" pitchFamily="49" charset="0"/>
-              </a:rPr>
-              <a:t> </a:t>
-            </a:r>
-            <a:r>
-              <a:rPr lang="nl-NL" sz="1600" dirty="0" err="1">
-                <a:solidFill>
-                  <a:schemeClr val="accent2">
-                    <a:lumMod val="75000"/>
-                  </a:schemeClr>
-                </a:solidFill>
-                <a:latin typeface="Courier New" panose="02070309020205020404" pitchFamily="49" charset="0"/>
-                <a:cs typeface="Courier New" panose="02070309020205020404" pitchFamily="49" charset="0"/>
-              </a:rPr>
-              <a:t>dishes</a:t>
-            </a:r>
-            <a:r>
-              <a:rPr lang="nl-NL" sz="1600" dirty="0">
-                <a:solidFill>
-                  <a:schemeClr val="accent2">
-                    <a:lumMod val="75000"/>
-                  </a:schemeClr>
-                </a:solidFill>
-                <a:latin typeface="Courier New" panose="02070309020205020404" pitchFamily="49" charset="0"/>
-                <a:cs typeface="Courier New" panose="02070309020205020404" pitchFamily="49" charset="0"/>
-              </a:rPr>
-              <a:t>"</a:t>
-            </a:r>
-            <a:r>
-              <a:rPr lang="nl-NL" sz="1600" dirty="0">
-                <a:latin typeface="Courier New" panose="02070309020205020404" pitchFamily="49" charset="0"/>
-                <a:cs typeface="Courier New" panose="02070309020205020404" pitchFamily="49" charset="0"/>
-              </a:rPr>
-              <a:t>)</a:t>
-            </a:r>
-          </a:p>
-          <a:p>
-            <a:pPr marL="0" indent="0">
-              <a:buNone/>
-            </a:pPr>
-            <a:endParaRPr lang="nl-NL" sz="1600" noProof="0" dirty="0">
+              <a:buNone/>
+            </a:pPr>
+            <a:r>
+              <a:rPr lang="en-US" sz="1600" dirty="0">
+                <a:latin typeface="Courier New" panose="02070309020205020404" pitchFamily="49" charset="0"/>
+                <a:cs typeface="Courier New" panose="02070309020205020404" pitchFamily="49" charset="0"/>
+              </a:rPr>
+              <a:t>}</a:t>
+            </a:r>
+            <a:endParaRPr lang="en-US" sz="1600" noProof="0" dirty="0">
               <a:latin typeface="Courier New" panose="02070309020205020404" pitchFamily="49" charset="0"/>
               <a:cs typeface="Courier New" panose="02070309020205020404" pitchFamily="49" charset="0"/>
             </a:endParaRPr>
           </a:p>
           <a:p>
             <a:pPr marL="0" indent="0">
-              <a:buNone/>
-            </a:pPr>
-            <a:endParaRPr lang="nl-NL" sz="1600" noProof="0" dirty="0">
-              <a:latin typeface="Courier New" panose="02070309020205020404" pitchFamily="49" charset="0"/>
-              <a:cs typeface="Courier New" panose="02070309020205020404" pitchFamily="49" charset="0"/>
-            </a:endParaRPr>
-          </a:p>
-          <a:p>
-            <a:pPr marL="0" indent="0">
-              <a:buNone/>
-            </a:pPr>
-            <a:r>
-              <a:rPr lang="nl-NL" sz="1600" dirty="0">
-                <a:solidFill>
-                  <a:schemeClr val="accent6">
-                    <a:lumMod val="75000"/>
-                  </a:schemeClr>
-                </a:solidFill>
-                <a:latin typeface="Courier New" panose="02070309020205020404" pitchFamily="49" charset="0"/>
-                <a:cs typeface="Courier New" panose="02070309020205020404" pitchFamily="49" charset="0"/>
-              </a:rPr>
-              <a:t># Objecten structuur.</a:t>
-            </a:r>
-          </a:p>
-          <a:p>
-            <a:pPr marL="0" indent="0">
-              <a:buNone/>
-            </a:pPr>
-            <a:r>
-              <a:rPr lang="nl-NL" sz="1600" dirty="0" err="1">
-                <a:latin typeface="Courier New" panose="02070309020205020404" pitchFamily="49" charset="0"/>
-                <a:cs typeface="Courier New" panose="02070309020205020404" pitchFamily="49" charset="0"/>
-              </a:rPr>
-              <a:t>TaskList</a:t>
-            </a:r>
-            <a:r>
-              <a:rPr lang="nl-NL" sz="1600" dirty="0">
-                <a:latin typeface="Courier New" panose="02070309020205020404" pitchFamily="49" charset="0"/>
-                <a:cs typeface="Courier New" panose="02070309020205020404" pitchFamily="49" charset="0"/>
-              </a:rPr>
-              <a:t> {</a:t>
-            </a:r>
-          </a:p>
-          <a:p>
-            <a:pPr marL="0" indent="0">
-              <a:buNone/>
-            </a:pPr>
-            <a:r>
-              <a:rPr lang="nl-NL" sz="1600" dirty="0">
-                <a:latin typeface="Courier New" panose="02070309020205020404" pitchFamily="49" charset="0"/>
-                <a:cs typeface="Courier New" panose="02070309020205020404" pitchFamily="49" charset="0"/>
-              </a:rPr>
-              <a:t>  name = </a:t>
-            </a:r>
-            <a:r>
-              <a:rPr lang="nl-NL" sz="1600" dirty="0">
-                <a:solidFill>
-                  <a:schemeClr val="accent2">
-                    <a:lumMod val="75000"/>
-                  </a:schemeClr>
-                </a:solidFill>
-                <a:latin typeface="Courier New" panose="02070309020205020404" pitchFamily="49" charset="0"/>
-                <a:cs typeface="Courier New" panose="02070309020205020404" pitchFamily="49" charset="0"/>
-              </a:rPr>
-              <a:t>"House </a:t>
-            </a:r>
-            <a:r>
-              <a:rPr lang="nl-NL" sz="1600" dirty="0" err="1">
-                <a:solidFill>
-                  <a:schemeClr val="accent2">
-                    <a:lumMod val="75000"/>
-                  </a:schemeClr>
-                </a:solidFill>
-                <a:latin typeface="Courier New" panose="02070309020205020404" pitchFamily="49" charset="0"/>
-                <a:cs typeface="Courier New" panose="02070309020205020404" pitchFamily="49" charset="0"/>
-              </a:rPr>
-              <a:t>keeping</a:t>
-            </a:r>
-            <a:r>
-              <a:rPr lang="nl-NL" sz="1600" dirty="0">
-                <a:solidFill>
-                  <a:schemeClr val="accent2">
-                    <a:lumMod val="75000"/>
-                  </a:schemeClr>
-                </a:solidFill>
-                <a:latin typeface="Courier New" panose="02070309020205020404" pitchFamily="49" charset="0"/>
-                <a:cs typeface="Courier New" panose="02070309020205020404" pitchFamily="49" charset="0"/>
-              </a:rPr>
-              <a:t>"</a:t>
-            </a:r>
-          </a:p>
-          <a:p>
-            <a:pPr marL="0" indent="0">
-              <a:buNone/>
-            </a:pPr>
-            <a:r>
-              <a:rPr lang="nl-NL" sz="1600" dirty="0">
-                <a:latin typeface="Courier New" panose="02070309020205020404" pitchFamily="49" charset="0"/>
-                <a:cs typeface="Courier New" panose="02070309020205020404" pitchFamily="49" charset="0"/>
-              </a:rPr>
-              <a:t>  </a:t>
-            </a:r>
-            <a:r>
-              <a:rPr lang="nl-NL" sz="1600" dirty="0" err="1">
-                <a:latin typeface="Courier New" panose="02070309020205020404" pitchFamily="49" charset="0"/>
-                <a:cs typeface="Courier New" panose="02070309020205020404" pitchFamily="49" charset="0"/>
-              </a:rPr>
-              <a:t>tasks</a:t>
-            </a:r>
-            <a:r>
-              <a:rPr lang="nl-NL" sz="1600" dirty="0">
-                <a:latin typeface="Courier New" panose="02070309020205020404" pitchFamily="49" charset="0"/>
-                <a:cs typeface="Courier New" panose="02070309020205020404" pitchFamily="49" charset="0"/>
-              </a:rPr>
-              <a:t> = [</a:t>
-            </a:r>
-          </a:p>
-          <a:p>
-            <a:pPr marL="0" indent="0">
-              <a:buNone/>
-            </a:pPr>
-            <a:r>
-              <a:rPr lang="nl-NL" sz="1600" dirty="0">
-                <a:latin typeface="Courier New" panose="02070309020205020404" pitchFamily="49" charset="0"/>
-                <a:cs typeface="Courier New" panose="02070309020205020404" pitchFamily="49" charset="0"/>
-              </a:rPr>
-              <a:t>    </a:t>
-            </a:r>
-            <a:r>
-              <a:rPr lang="nl-NL" sz="1600" dirty="0" err="1">
-                <a:latin typeface="Courier New" panose="02070309020205020404" pitchFamily="49" charset="0"/>
-                <a:cs typeface="Courier New" panose="02070309020205020404" pitchFamily="49" charset="0"/>
-              </a:rPr>
-              <a:t>Task</a:t>
-            </a:r>
-            <a:r>
-              <a:rPr lang="nl-NL" sz="1600" dirty="0">
-                <a:latin typeface="Courier New" panose="02070309020205020404" pitchFamily="49" charset="0"/>
-                <a:cs typeface="Courier New" panose="02070309020205020404" pitchFamily="49" charset="0"/>
-              </a:rPr>
-              <a:t> {</a:t>
-            </a:r>
-          </a:p>
-          <a:p>
-            <a:pPr marL="0" indent="0">
-              <a:buNone/>
-            </a:pPr>
-            <a:r>
-              <a:rPr lang="nl-NL" sz="1600" dirty="0">
-                <a:latin typeface="Courier New" panose="02070309020205020404" pitchFamily="49" charset="0"/>
-                <a:cs typeface="Courier New" panose="02070309020205020404" pitchFamily="49" charset="0"/>
-              </a:rPr>
-              <a:t>       </a:t>
-            </a:r>
-            <a:r>
-              <a:rPr lang="nl-NL" sz="1600" dirty="0" err="1">
-                <a:latin typeface="Courier New" panose="02070309020205020404" pitchFamily="49" charset="0"/>
-                <a:cs typeface="Courier New" panose="02070309020205020404" pitchFamily="49" charset="0"/>
-              </a:rPr>
-              <a:t>description</a:t>
-            </a:r>
-            <a:r>
-              <a:rPr lang="nl-NL" sz="1600" dirty="0">
-                <a:latin typeface="Courier New" panose="02070309020205020404" pitchFamily="49" charset="0"/>
-                <a:cs typeface="Courier New" panose="02070309020205020404" pitchFamily="49" charset="0"/>
-              </a:rPr>
-              <a:t> = </a:t>
-            </a:r>
-            <a:r>
-              <a:rPr lang="nl-NL" sz="1600" dirty="0">
-                <a:solidFill>
-                  <a:schemeClr val="accent2">
-                    <a:lumMod val="75000"/>
-                  </a:schemeClr>
-                </a:solidFill>
-                <a:latin typeface="Courier New" panose="02070309020205020404" pitchFamily="49" charset="0"/>
-                <a:cs typeface="Courier New" panose="02070309020205020404" pitchFamily="49" charset="0"/>
-              </a:rPr>
-              <a:t>"Do </a:t>
-            </a:r>
-            <a:r>
-              <a:rPr lang="nl-NL" sz="1600" dirty="0" err="1">
-                <a:solidFill>
-                  <a:schemeClr val="accent2">
-                    <a:lumMod val="75000"/>
-                  </a:schemeClr>
-                </a:solidFill>
-                <a:latin typeface="Courier New" panose="02070309020205020404" pitchFamily="49" charset="0"/>
-                <a:cs typeface="Courier New" panose="02070309020205020404" pitchFamily="49" charset="0"/>
-              </a:rPr>
-              <a:t>the</a:t>
-            </a:r>
-            <a:r>
-              <a:rPr lang="nl-NL" sz="1600" dirty="0">
-                <a:solidFill>
-                  <a:schemeClr val="accent2">
-                    <a:lumMod val="75000"/>
-                  </a:schemeClr>
-                </a:solidFill>
-                <a:latin typeface="Courier New" panose="02070309020205020404" pitchFamily="49" charset="0"/>
-                <a:cs typeface="Courier New" panose="02070309020205020404" pitchFamily="49" charset="0"/>
-              </a:rPr>
-              <a:t> </a:t>
-            </a:r>
-            <a:r>
-              <a:rPr lang="nl-NL" sz="1600" dirty="0" err="1">
-                <a:solidFill>
-                  <a:schemeClr val="accent2">
-                    <a:lumMod val="75000"/>
-                  </a:schemeClr>
-                </a:solidFill>
-                <a:latin typeface="Courier New" panose="02070309020205020404" pitchFamily="49" charset="0"/>
-                <a:cs typeface="Courier New" panose="02070309020205020404" pitchFamily="49" charset="0"/>
-              </a:rPr>
-              <a:t>dishes</a:t>
-            </a:r>
-            <a:r>
-              <a:rPr lang="nl-NL" sz="1600" dirty="0">
-                <a:solidFill>
-                  <a:schemeClr val="accent2">
-                    <a:lumMod val="75000"/>
-                  </a:schemeClr>
-                </a:solidFill>
-                <a:latin typeface="Courier New" panose="02070309020205020404" pitchFamily="49" charset="0"/>
-                <a:cs typeface="Courier New" panose="02070309020205020404" pitchFamily="49" charset="0"/>
-              </a:rPr>
-              <a:t>"</a:t>
-            </a:r>
-            <a:r>
-              <a:rPr lang="nl-NL" sz="1600" dirty="0">
-                <a:latin typeface="Courier New" panose="02070309020205020404" pitchFamily="49" charset="0"/>
-                <a:cs typeface="Courier New" panose="02070309020205020404" pitchFamily="49" charset="0"/>
-              </a:rPr>
-              <a:t>,</a:t>
-            </a:r>
-          </a:p>
-          <a:p>
-            <a:pPr marL="0" indent="0">
-              <a:buNone/>
-            </a:pPr>
-            <a:r>
-              <a:rPr lang="nl-NL" sz="1600" dirty="0">
-                <a:latin typeface="Courier New" panose="02070309020205020404" pitchFamily="49" charset="0"/>
-                <a:cs typeface="Courier New" panose="02070309020205020404" pitchFamily="49" charset="0"/>
-              </a:rPr>
-              <a:t>       state = </a:t>
-            </a:r>
-            <a:r>
-              <a:rPr lang="nl-NL" sz="1600" dirty="0" err="1">
-                <a:latin typeface="Courier New" panose="02070309020205020404" pitchFamily="49" charset="0"/>
-                <a:cs typeface="Courier New" panose="02070309020205020404" pitchFamily="49" charset="0"/>
-              </a:rPr>
-              <a:t>State.NEW</a:t>
-            </a:r>
-            <a:r>
-              <a:rPr lang="nl-NL" sz="1600" dirty="0">
-                <a:latin typeface="Courier New" panose="02070309020205020404" pitchFamily="49" charset="0"/>
-                <a:cs typeface="Courier New" panose="02070309020205020404" pitchFamily="49" charset="0"/>
-              </a:rPr>
-              <a:t>,</a:t>
-            </a:r>
-          </a:p>
-          <a:p>
-            <a:pPr marL="0" indent="0">
-              <a:buNone/>
-            </a:pPr>
-            <a:r>
-              <a:rPr lang="nl-NL" sz="1600" dirty="0">
-                <a:latin typeface="Courier New" panose="02070309020205020404" pitchFamily="49" charset="0"/>
-                <a:cs typeface="Courier New" panose="02070309020205020404" pitchFamily="49" charset="0"/>
-              </a:rPr>
-              <a:t>       </a:t>
-            </a:r>
-            <a:r>
-              <a:rPr lang="nl-NL" sz="1600" dirty="0" err="1">
-                <a:latin typeface="Courier New" panose="02070309020205020404" pitchFamily="49" charset="0"/>
-                <a:cs typeface="Courier New" panose="02070309020205020404" pitchFamily="49" charset="0"/>
-              </a:rPr>
-              <a:t>updated</a:t>
-            </a:r>
-            <a:r>
-              <a:rPr lang="nl-NL" sz="1600" dirty="0">
-                <a:latin typeface="Courier New" panose="02070309020205020404" pitchFamily="49" charset="0"/>
-                <a:cs typeface="Courier New" panose="02070309020205020404" pitchFamily="49" charset="0"/>
-              </a:rPr>
-              <a:t> = </a:t>
-            </a:r>
-            <a:r>
-              <a:rPr lang="nl-NL" sz="1600" dirty="0">
-                <a:solidFill>
-                  <a:schemeClr val="accent2">
-                    <a:lumMod val="75000"/>
-                  </a:schemeClr>
-                </a:solidFill>
-                <a:latin typeface="Courier New" panose="02070309020205020404" pitchFamily="49" charset="0"/>
-                <a:cs typeface="Courier New" panose="02070309020205020404" pitchFamily="49" charset="0"/>
-              </a:rPr>
-              <a:t>"2025-01-01 15:05:07"</a:t>
-            </a:r>
-            <a:r>
-              <a:rPr lang="nl-NL" sz="1600" dirty="0">
-                <a:latin typeface="Courier New" panose="02070309020205020404" pitchFamily="49" charset="0"/>
-                <a:cs typeface="Courier New" panose="02070309020205020404" pitchFamily="49" charset="0"/>
-              </a:rPr>
-              <a:t>,</a:t>
-            </a:r>
-          </a:p>
-          <a:p>
-            <a:pPr marL="0" indent="0">
-              <a:buNone/>
-            </a:pPr>
-            <a:r>
-              <a:rPr lang="nl-NL" sz="1600" dirty="0">
-                <a:latin typeface="Courier New" panose="02070309020205020404" pitchFamily="49" charset="0"/>
-                <a:cs typeface="Courier New" panose="02070309020205020404" pitchFamily="49" charset="0"/>
-              </a:rPr>
-              <a:t>    }</a:t>
-            </a:r>
-          </a:p>
-          <a:p>
-            <a:pPr marL="0" indent="0">
-              <a:buNone/>
-            </a:pPr>
-            <a:r>
-              <a:rPr lang="nl-NL" sz="1600" dirty="0">
-                <a:latin typeface="Courier New" panose="02070309020205020404" pitchFamily="49" charset="0"/>
-                <a:cs typeface="Courier New" panose="02070309020205020404" pitchFamily="49" charset="0"/>
-              </a:rPr>
-              <a:t>  ]</a:t>
-            </a:r>
-            <a:endParaRPr lang="nl-NL" sz="1600" noProof="0" dirty="0">
-              <a:latin typeface="Courier New" panose="02070309020205020404" pitchFamily="49" charset="0"/>
-              <a:cs typeface="Courier New" panose="02070309020205020404" pitchFamily="49" charset="0"/>
-            </a:endParaRPr>
-          </a:p>
-          <a:p>
-            <a:pPr marL="0" indent="0">
-              <a:buNone/>
-            </a:pPr>
-            <a:r>
-              <a:rPr lang="nl-NL" sz="1600" dirty="0">
-                <a:latin typeface="Courier New" panose="02070309020205020404" pitchFamily="49" charset="0"/>
-                <a:cs typeface="Courier New" panose="02070309020205020404" pitchFamily="49" charset="0"/>
-              </a:rPr>
-              <a:t>}</a:t>
-            </a:r>
-            <a:endParaRPr lang="nl-NL" sz="1600" noProof="0" dirty="0">
-              <a:latin typeface="Courier New" panose="02070309020205020404" pitchFamily="49" charset="0"/>
-              <a:cs typeface="Courier New" panose="02070309020205020404" pitchFamily="49" charset="0"/>
-            </a:endParaRPr>
-          </a:p>
-          <a:p>
-            <a:pPr marL="0" indent="0">
               <a:buFont typeface="Arial" panose="020B0604020202020204" pitchFamily="34" charset="0"/>
               <a:buNone/>
             </a:pPr>
-            <a:endParaRPr lang="nl-NL" sz="1600" noProof="0" dirty="0">
+            <a:endParaRPr lang="en-US" sz="1600" noProof="0" dirty="0">
               <a:latin typeface="Courier New" panose="02070309020205020404" pitchFamily="49" charset="0"/>
               <a:cs typeface="Courier New" panose="02070309020205020404" pitchFamily="49" charset="0"/>
             </a:endParaRPr>
@@ -27917,7 +27533,7 @@
               <a:buNone/>
             </a:pPr>
             <a:r>
-              <a:rPr lang="nl-NL" sz="1600" noProof="0" dirty="0">
+              <a:rPr lang="en-US" sz="1600" noProof="0" dirty="0">
                 <a:solidFill>
                   <a:schemeClr val="accent6">
                     <a:lumMod val="75000"/>
@@ -27926,10 +27542,10 @@
                 <a:latin typeface="Courier New" panose="02070309020205020404" pitchFamily="49" charset="0"/>
                 <a:cs typeface="Courier New" panose="02070309020205020404" pitchFamily="49" charset="0"/>
               </a:rPr>
-              <a:t># </a:t>
-            </a:r>
-            <a:r>
-              <a:rPr lang="nl-NL" sz="1600" noProof="0" dirty="0" err="1">
+              <a:t># Create a </a:t>
+            </a:r>
+            <a:r>
+              <a:rPr lang="en-US" sz="1600" noProof="0" dirty="0" err="1">
                 <a:solidFill>
                   <a:schemeClr val="accent6">
                     <a:lumMod val="75000"/>
@@ -27938,10 +27554,10 @@
                 <a:latin typeface="Courier New" panose="02070309020205020404" pitchFamily="49" charset="0"/>
                 <a:cs typeface="Courier New" panose="02070309020205020404" pitchFamily="49" charset="0"/>
               </a:rPr>
-              <a:t>Create</a:t>
-            </a:r>
-            <a:r>
-              <a:rPr lang="nl-NL" sz="1600" noProof="0" dirty="0">
+              <a:t>TaskList</a:t>
+            </a:r>
+            <a:r>
+              <a:rPr lang="en-US" sz="1600" noProof="0" dirty="0">
                 <a:solidFill>
                   <a:schemeClr val="accent6">
                     <a:lumMod val="75000"/>
@@ -27950,103 +27566,7 @@
                 <a:latin typeface="Courier New" panose="02070309020205020404" pitchFamily="49" charset="0"/>
                 <a:cs typeface="Courier New" panose="02070309020205020404" pitchFamily="49" charset="0"/>
               </a:rPr>
-              <a:t> a </a:t>
-            </a:r>
-            <a:r>
-              <a:rPr lang="nl-NL" sz="1600" noProof="0" dirty="0" err="1">
-                <a:solidFill>
-                  <a:schemeClr val="accent6">
-                    <a:lumMod val="75000"/>
-                  </a:schemeClr>
-                </a:solidFill>
-                <a:latin typeface="Courier New" panose="02070309020205020404" pitchFamily="49" charset="0"/>
-                <a:cs typeface="Courier New" panose="02070309020205020404" pitchFamily="49" charset="0"/>
-              </a:rPr>
-              <a:t>task</a:t>
-            </a:r>
-            <a:r>
-              <a:rPr lang="nl-NL" sz="1600" noProof="0" dirty="0">
-                <a:solidFill>
-                  <a:schemeClr val="accent6">
-                    <a:lumMod val="75000"/>
-                  </a:schemeClr>
-                </a:solidFill>
-                <a:latin typeface="Courier New" panose="02070309020205020404" pitchFamily="49" charset="0"/>
-                <a:cs typeface="Courier New" panose="02070309020205020404" pitchFamily="49" charset="0"/>
-              </a:rPr>
-              <a:t> list </a:t>
-            </a:r>
-            <a:r>
-              <a:rPr lang="nl-NL" sz="1600" noProof="0" dirty="0" err="1">
-                <a:solidFill>
-                  <a:schemeClr val="accent6">
-                    <a:lumMod val="75000"/>
-                  </a:schemeClr>
-                </a:solidFill>
-                <a:latin typeface="Courier New" panose="02070309020205020404" pitchFamily="49" charset="0"/>
-                <a:cs typeface="Courier New" panose="02070309020205020404" pitchFamily="49" charset="0"/>
-              </a:rPr>
-              <a:t>and</a:t>
-            </a:r>
-            <a:r>
-              <a:rPr lang="nl-NL" sz="1600" noProof="0" dirty="0">
-                <a:solidFill>
-                  <a:schemeClr val="accent6">
-                    <a:lumMod val="75000"/>
-                  </a:schemeClr>
-                </a:solidFill>
-                <a:latin typeface="Courier New" panose="02070309020205020404" pitchFamily="49" charset="0"/>
-                <a:cs typeface="Courier New" panose="02070309020205020404" pitchFamily="49" charset="0"/>
-              </a:rPr>
-              <a:t> </a:t>
-            </a:r>
-            <a:r>
-              <a:rPr lang="nl-NL" sz="1600" noProof="0" dirty="0" err="1">
-                <a:solidFill>
-                  <a:schemeClr val="accent6">
-                    <a:lumMod val="75000"/>
-                  </a:schemeClr>
-                </a:solidFill>
-                <a:latin typeface="Courier New" panose="02070309020205020404" pitchFamily="49" charset="0"/>
-                <a:cs typeface="Courier New" panose="02070309020205020404" pitchFamily="49" charset="0"/>
-              </a:rPr>
-              <a:t>add</a:t>
-            </a:r>
-            <a:r>
-              <a:rPr lang="nl-NL" sz="1600" noProof="0" dirty="0">
-                <a:solidFill>
-                  <a:schemeClr val="accent6">
-                    <a:lumMod val="75000"/>
-                  </a:schemeClr>
-                </a:solidFill>
-                <a:latin typeface="Courier New" panose="02070309020205020404" pitchFamily="49" charset="0"/>
-                <a:cs typeface="Courier New" panose="02070309020205020404" pitchFamily="49" charset="0"/>
-              </a:rPr>
-              <a:t> a </a:t>
-            </a:r>
-            <a:r>
-              <a:rPr lang="nl-NL" sz="1600" noProof="0" dirty="0" err="1">
-                <a:solidFill>
-                  <a:schemeClr val="accent6">
-                    <a:lumMod val="75000"/>
-                  </a:schemeClr>
-                </a:solidFill>
-                <a:latin typeface="Courier New" panose="02070309020205020404" pitchFamily="49" charset="0"/>
-                <a:cs typeface="Courier New" panose="02070309020205020404" pitchFamily="49" charset="0"/>
-              </a:rPr>
-              <a:t>task</a:t>
-            </a:r>
-            <a:r>
-              <a:rPr lang="nl-NL" sz="1600" noProof="0" dirty="0">
-                <a:solidFill>
-                  <a:schemeClr val="accent6">
-                    <a:lumMod val="75000"/>
-                  </a:schemeClr>
-                </a:solidFill>
-                <a:latin typeface="Courier New" panose="02070309020205020404" pitchFamily="49" charset="0"/>
-                <a:cs typeface="Courier New" panose="02070309020205020404" pitchFamily="49" charset="0"/>
-              </a:rPr>
-              <a:t>.</a:t>
+              <a:t> and add a task.</a:t>
             </a:r>
           </a:p>
           <a:p>
@@ -28172,7 +27692,7 @@
               <a:buNone/>
             </a:pPr>
             <a:r>
-              <a:rPr lang="nl-NL" sz="1600" dirty="0">
+              <a:rPr lang="en-US" sz="1600" dirty="0">
                 <a:solidFill>
                   <a:schemeClr val="accent6">
                     <a:lumMod val="75000"/>
@@ -28181,7 +27701,7 @@
                 <a:latin typeface="Courier New" panose="02070309020205020404" pitchFamily="49" charset="0"/>
                 <a:cs typeface="Courier New" panose="02070309020205020404" pitchFamily="49" charset="0"/>
               </a:rPr>
-              <a:t># Objecten structuur.</a:t>
+              <a:t># Resulting object structure.</a:t>
             </a:r>
           </a:p>
           <a:p>
@@ -31327,11 +30847,18 @@
               <a:buNone/>
             </a:pPr>
             <a:r>
+              <a:rPr lang="en-US" sz="1400" b="1" dirty="0">
+                <a:latin typeface="Courier New" panose="02070309020205020404" pitchFamily="49" charset="0"/>
+                <a:cs typeface="Courier New" panose="02070309020205020404" pitchFamily="49" charset="0"/>
+              </a:rPr>
+              <a:t>class Task</a:t>
+            </a:r>
+            <a:r>
               <a:rPr lang="en-US" sz="1400" dirty="0">
                 <a:latin typeface="Courier New" panose="02070309020205020404" pitchFamily="49" charset="0"/>
                 <a:cs typeface="Courier New" panose="02070309020205020404" pitchFamily="49" charset="0"/>
               </a:rPr>
-              <a:t>class Task(</a:t>
+              <a:t>(</a:t>
             </a:r>
             <a:r>
               <a:rPr lang="en-US" sz="1400" dirty="0" err="1">
@@ -31376,7 +30903,7 @@
                 <a:latin typeface="Courier New" panose="02070309020205020404" pitchFamily="49" charset="0"/>
                 <a:cs typeface="Courier New" panose="02070309020205020404" pitchFamily="49" charset="0"/>
               </a:rPr>
-              <a:t> </a:t>
+              <a:t>  </a:t>
             </a:r>
             <a:r>
               <a:rPr lang="en-US" sz="1400" noProof="0" dirty="0">
@@ -31445,7 +30972,7 @@
                 <a:latin typeface="Courier New" panose="02070309020205020404" pitchFamily="49" charset="0"/>
                 <a:cs typeface="Courier New" panose="02070309020205020404" pitchFamily="49" charset="0"/>
               </a:rPr>
-              <a:t>SQLAlchemy</a:t>
+              <a:t>sqlalchemy</a:t>
             </a:r>
             <a:r>
               <a:rPr lang="en-US" sz="1400" dirty="0">
@@ -33563,6 +33090,22 @@
               </a:rPr>
               <a:t>"New"</a:t>
             </a:r>
+            <a:r>
+              <a:rPr lang="en-US" sz="1400" dirty="0">
+                <a:latin typeface="Courier New" panose="02070309020205020404" pitchFamily="49" charset="0"/>
+                <a:cs typeface="Courier New" panose="02070309020205020404" pitchFamily="49" charset="0"/>
+              </a:rPr>
+              <a:t>)</a:t>
+            </a:r>
+            <a:endParaRPr lang="en-US" sz="1400" dirty="0">
+              <a:solidFill>
+                <a:schemeClr val="accent2">
+                  <a:lumMod val="75000"/>
+                </a:schemeClr>
+              </a:solidFill>
+              <a:latin typeface="Courier New" panose="02070309020205020404" pitchFamily="49" charset="0"/>
+              <a:cs typeface="Courier New" panose="02070309020205020404" pitchFamily="49" charset="0"/>
+            </a:endParaRPr>
           </a:p>
           <a:p>
             <a:pPr marL="0" indent="0">

</xml_diff>

<commit_message>
Minor fixes SQL part 3
</commit_message>
<xml_diff>
--- a/sql_course/3_python/3_python.pptx
+++ b/sql_course/3_python/3_python.pptx
@@ -262,7 +262,7 @@
           <a:p>
             <a:fld id="{685BAE75-55A4-4394-9868-AE29E61D43AE}" type="datetimeFigureOut">
               <a:rPr lang="nl-NL" smtClean="0"/>
-              <a:t>6-2-2025</a:t>
+              <a:t>7-2-2025</a:t>
             </a:fld>
             <a:endParaRPr lang="nl-NL"/>
           </a:p>
@@ -825,6 +825,90 @@
 </p:notes>
 </file>
 
+<file path=ppt/notesSlides/notesSlide4.xml><?xml version="1.0" encoding="utf-8"?>
+<p:notes xmlns:a="http://schemas.openxmlformats.org/drawingml/2006/main" xmlns:r="http://schemas.openxmlformats.org/officeDocument/2006/relationships" xmlns:p="http://schemas.openxmlformats.org/presentationml/2006/main">
+  <p:cSld>
+    <p:spTree>
+      <p:nvGrpSpPr>
+        <p:cNvPr id="1" name=""/>
+        <p:cNvGrpSpPr/>
+        <p:nvPr/>
+      </p:nvGrpSpPr>
+      <p:grpSpPr>
+        <a:xfrm>
+          <a:off x="0" y="0"/>
+          <a:ext cx="0" cy="0"/>
+          <a:chOff x="0" y="0"/>
+          <a:chExt cx="0" cy="0"/>
+        </a:xfrm>
+      </p:grpSpPr>
+      <p:sp>
+        <p:nvSpPr>
+          <p:cNvPr id="2" name="Slide Image Placeholder 1"/>
+          <p:cNvSpPr>
+            <a:spLocks noGrp="1" noRot="1" noChangeAspect="1"/>
+          </p:cNvSpPr>
+          <p:nvPr>
+            <p:ph type="sldImg"/>
+          </p:nvPr>
+        </p:nvSpPr>
+        <p:spPr/>
+      </p:sp>
+      <p:sp>
+        <p:nvSpPr>
+          <p:cNvPr id="3" name="Notes Placeholder 2"/>
+          <p:cNvSpPr>
+            <a:spLocks noGrp="1"/>
+          </p:cNvSpPr>
+          <p:nvPr>
+            <p:ph type="body" idx="1"/>
+          </p:nvPr>
+        </p:nvSpPr>
+        <p:spPr/>
+        <p:txBody>
+          <a:bodyPr/>
+          <a:lstStyle/>
+          <a:p>
+            <a:endParaRPr lang="en-NL"/>
+          </a:p>
+        </p:txBody>
+      </p:sp>
+      <p:sp>
+        <p:nvSpPr>
+          <p:cNvPr id="4" name="Slide Number Placeholder 3"/>
+          <p:cNvSpPr>
+            <a:spLocks noGrp="1"/>
+          </p:cNvSpPr>
+          <p:nvPr>
+            <p:ph type="sldNum" sz="quarter" idx="5"/>
+          </p:nvPr>
+        </p:nvSpPr>
+        <p:spPr/>
+        <p:txBody>
+          <a:bodyPr/>
+          <a:lstStyle/>
+          <a:p>
+            <a:fld id="{592CCAD8-DC29-44DA-AA6C-03A5A9FE5209}" type="slidenum">
+              <a:rPr lang="nl-NL" smtClean="0"/>
+              <a:t>48</a:t>
+            </a:fld>
+            <a:endParaRPr lang="nl-NL"/>
+          </a:p>
+        </p:txBody>
+      </p:sp>
+    </p:spTree>
+    <p:extLst>
+      <p:ext uri="{BB962C8B-B14F-4D97-AF65-F5344CB8AC3E}">
+        <p14:creationId xmlns:p14="http://schemas.microsoft.com/office/powerpoint/2010/main" val="4172926022"/>
+      </p:ext>
+    </p:extLst>
+  </p:cSld>
+  <p:clrMapOvr>
+    <a:masterClrMapping/>
+  </p:clrMapOvr>
+</p:notes>
+</file>
+
 <file path=ppt/slideLayouts/slideLayout1.xml><?xml version="1.0" encoding="utf-8"?>
 <p:sldLayout xmlns:a="http://schemas.openxmlformats.org/drawingml/2006/main" xmlns:r="http://schemas.openxmlformats.org/officeDocument/2006/relationships" xmlns:p="http://schemas.openxmlformats.org/presentationml/2006/main" type="title" preserve="1">
   <p:cSld name="Title Slide">
@@ -974,7 +1058,7 @@
           <a:p>
             <a:fld id="{74C49272-0111-4310-A9F0-C1CA0D6AA5E5}" type="datetimeFigureOut">
               <a:rPr lang="en-NL" smtClean="0"/>
-              <a:t>06/02/2025</a:t>
+              <a:t>07/02/2025</a:t>
             </a:fld>
             <a:endParaRPr lang="en-NL"/>
           </a:p>
@@ -1174,7 +1258,7 @@
           <a:p>
             <a:fld id="{74C49272-0111-4310-A9F0-C1CA0D6AA5E5}" type="datetimeFigureOut">
               <a:rPr lang="en-NL" smtClean="0"/>
-              <a:t>06/02/2025</a:t>
+              <a:t>07/02/2025</a:t>
             </a:fld>
             <a:endParaRPr lang="en-NL"/>
           </a:p>
@@ -1384,7 +1468,7 @@
           <a:p>
             <a:fld id="{74C49272-0111-4310-A9F0-C1CA0D6AA5E5}" type="datetimeFigureOut">
               <a:rPr lang="en-NL" smtClean="0"/>
-              <a:t>06/02/2025</a:t>
+              <a:t>07/02/2025</a:t>
             </a:fld>
             <a:endParaRPr lang="en-NL"/>
           </a:p>
@@ -1584,7 +1668,7 @@
           <a:p>
             <a:fld id="{74C49272-0111-4310-A9F0-C1CA0D6AA5E5}" type="datetimeFigureOut">
               <a:rPr lang="en-NL" smtClean="0"/>
-              <a:t>06/02/2025</a:t>
+              <a:t>07/02/2025</a:t>
             </a:fld>
             <a:endParaRPr lang="en-NL"/>
           </a:p>
@@ -1860,7 +1944,7 @@
           <a:p>
             <a:fld id="{74C49272-0111-4310-A9F0-C1CA0D6AA5E5}" type="datetimeFigureOut">
               <a:rPr lang="en-NL" smtClean="0"/>
-              <a:t>06/02/2025</a:t>
+              <a:t>07/02/2025</a:t>
             </a:fld>
             <a:endParaRPr lang="en-NL"/>
           </a:p>
@@ -2128,7 +2212,7 @@
           <a:p>
             <a:fld id="{74C49272-0111-4310-A9F0-C1CA0D6AA5E5}" type="datetimeFigureOut">
               <a:rPr lang="en-NL" smtClean="0"/>
-              <a:t>06/02/2025</a:t>
+              <a:t>07/02/2025</a:t>
             </a:fld>
             <a:endParaRPr lang="en-NL"/>
           </a:p>
@@ -2543,7 +2627,7 @@
           <a:p>
             <a:fld id="{74C49272-0111-4310-A9F0-C1CA0D6AA5E5}" type="datetimeFigureOut">
               <a:rPr lang="en-NL" smtClean="0"/>
-              <a:t>06/02/2025</a:t>
+              <a:t>07/02/2025</a:t>
             </a:fld>
             <a:endParaRPr lang="en-NL"/>
           </a:p>
@@ -2685,7 +2769,7 @@
           <a:p>
             <a:fld id="{74C49272-0111-4310-A9F0-C1CA0D6AA5E5}" type="datetimeFigureOut">
               <a:rPr lang="en-NL" smtClean="0"/>
-              <a:t>06/02/2025</a:t>
+              <a:t>07/02/2025</a:t>
             </a:fld>
             <a:endParaRPr lang="en-NL"/>
           </a:p>
@@ -2798,7 +2882,7 @@
           <a:p>
             <a:fld id="{74C49272-0111-4310-A9F0-C1CA0D6AA5E5}" type="datetimeFigureOut">
               <a:rPr lang="en-NL" smtClean="0"/>
-              <a:t>06/02/2025</a:t>
+              <a:t>07/02/2025</a:t>
             </a:fld>
             <a:endParaRPr lang="en-NL"/>
           </a:p>
@@ -3111,7 +3195,7 @@
           <a:p>
             <a:fld id="{74C49272-0111-4310-A9F0-C1CA0D6AA5E5}" type="datetimeFigureOut">
               <a:rPr lang="en-NL" smtClean="0"/>
-              <a:t>06/02/2025</a:t>
+              <a:t>07/02/2025</a:t>
             </a:fld>
             <a:endParaRPr lang="en-NL"/>
           </a:p>
@@ -3400,7 +3484,7 @@
           <a:p>
             <a:fld id="{74C49272-0111-4310-A9F0-C1CA0D6AA5E5}" type="datetimeFigureOut">
               <a:rPr lang="en-NL" smtClean="0"/>
-              <a:t>06/02/2025</a:t>
+              <a:t>07/02/2025</a:t>
             </a:fld>
             <a:endParaRPr lang="en-NL"/>
           </a:p>
@@ -3643,7 +3727,7 @@
           <a:p>
             <a:fld id="{74C49272-0111-4310-A9F0-C1CA0D6AA5E5}" type="datetimeFigureOut">
               <a:rPr lang="en-NL" smtClean="0"/>
-              <a:t>06/02/2025</a:t>
+              <a:t>07/02/2025</a:t>
             </a:fld>
             <a:endParaRPr lang="en-NL"/>
           </a:p>
@@ -11832,32 +11916,11 @@
               <a:buNone/>
             </a:pPr>
             <a:r>
-              <a:rPr lang="nl-NL" sz="1600" noProof="0" dirty="0" err="1">
-                <a:latin typeface="Courier New" panose="02070309020205020404" pitchFamily="49" charset="0"/>
-                <a:cs typeface="Courier New" panose="02070309020205020404" pitchFamily="49" charset="0"/>
-              </a:rPr>
-              <a:t>result</a:t>
-            </a:r>
-            <a:r>
-              <a:rPr lang="nl-NL" sz="1600" noProof="0" dirty="0">
-                <a:latin typeface="Courier New" panose="02070309020205020404" pitchFamily="49" charset="0"/>
-                <a:cs typeface="Courier New" panose="02070309020205020404" pitchFamily="49" charset="0"/>
-              </a:rPr>
-              <a:t> = </a:t>
-            </a:r>
-            <a:r>
-              <a:rPr lang="nl-NL" sz="1600" noProof="0" dirty="0" err="1">
-                <a:latin typeface="Courier New" panose="02070309020205020404" pitchFamily="49" charset="0"/>
-                <a:cs typeface="Courier New" panose="02070309020205020404" pitchFamily="49" charset="0"/>
-              </a:rPr>
-              <a:t>cursor.fetchall</a:t>
-            </a:r>
-            <a:r>
-              <a:rPr lang="nl-NL" sz="1600" noProof="0" dirty="0">
-                <a:latin typeface="Courier New" panose="02070309020205020404" pitchFamily="49" charset="0"/>
-                <a:cs typeface="Courier New" panose="02070309020205020404" pitchFamily="49" charset="0"/>
-              </a:rPr>
-              <a:t>()</a:t>
+              <a:rPr lang="nl-NL" sz="1600" noProof="0">
+                <a:latin typeface="Courier New" panose="02070309020205020404" pitchFamily="49" charset="0"/>
+                <a:cs typeface="Courier New" panose="02070309020205020404" pitchFamily="49" charset="0"/>
+              </a:rPr>
+              <a:t>result = cursor.fetchall()</a:t>
             </a:r>
           </a:p>
           <a:p>
@@ -11865,7 +11928,7 @@
               <a:buFont typeface="Arial" panose="020B0604020202020204" pitchFamily="34" charset="0"/>
               <a:buNone/>
             </a:pPr>
-            <a:endParaRPr lang="nl-NL" sz="1600" dirty="0">
+            <a:endParaRPr lang="nl-NL" sz="1600">
               <a:latin typeface="Courier New" panose="02070309020205020404" pitchFamily="49" charset="0"/>
               <a:cs typeface="Courier New" panose="02070309020205020404" pitchFamily="49" charset="0"/>
             </a:endParaRPr>
@@ -11876,7 +11939,7 @@
               <a:buNone/>
             </a:pPr>
             <a:r>
-              <a:rPr lang="nl-NL" sz="1600" dirty="0">
+              <a:rPr lang="nl-NL" sz="1600">
                 <a:solidFill>
                   <a:schemeClr val="accent6">
                     <a:lumMod val="75000"/>
@@ -11885,10 +11948,27 @@
                 <a:latin typeface="Courier New" panose="02070309020205020404" pitchFamily="49" charset="0"/>
                 <a:cs typeface="Courier New" panose="02070309020205020404" pitchFamily="49" charset="0"/>
               </a:rPr>
-              <a:t># Resultaat is lijst van </a:t>
-            </a:r>
-            <a:r>
-              <a:rPr lang="nl-NL" sz="1600" dirty="0" err="1">
+              <a:t># Resultaat is lijst van tuples.</a:t>
+            </a:r>
+          </a:p>
+          <a:p>
+            <a:pPr marL="0" indent="0">
+              <a:buNone/>
+            </a:pPr>
+            <a:r>
+              <a:rPr lang="nl-NL" sz="1600" noProof="0">
+                <a:latin typeface="Courier New" panose="02070309020205020404" pitchFamily="49" charset="0"/>
+                <a:cs typeface="Courier New" panose="02070309020205020404" pitchFamily="49" charset="0"/>
+              </a:rPr>
+              <a:t>print(result)</a:t>
+            </a:r>
+          </a:p>
+          <a:p>
+            <a:pPr marL="0" indent="0">
+              <a:buNone/>
+            </a:pPr>
+            <a:r>
+              <a:rPr lang="nl-NL" sz="1600">
                 <a:solidFill>
                   <a:schemeClr val="accent6">
                     <a:lumMod val="75000"/>
@@ -11897,10 +11977,30 @@
                 <a:latin typeface="Courier New" panose="02070309020205020404" pitchFamily="49" charset="0"/>
                 <a:cs typeface="Courier New" panose="02070309020205020404" pitchFamily="49" charset="0"/>
               </a:rPr>
-              <a:t>tuples</a:t>
-            </a:r>
-            <a:r>
-              <a:rPr lang="nl-NL" sz="1600" dirty="0">
+              <a:t># [(1, 'John', ' Doe')]</a:t>
+            </a:r>
+            <a:endParaRPr lang="nl-NL" sz="1600" noProof="0">
+              <a:latin typeface="Courier New" panose="02070309020205020404" pitchFamily="49" charset="0"/>
+              <a:cs typeface="Courier New" panose="02070309020205020404" pitchFamily="49" charset="0"/>
+            </a:endParaRPr>
+          </a:p>
+          <a:p>
+            <a:pPr marL="0" indent="0">
+              <a:buFont typeface="Arial" panose="020B0604020202020204" pitchFamily="34" charset="0"/>
+              <a:buNone/>
+            </a:pPr>
+            <a:endParaRPr lang="nl-NL" sz="1600">
+              <a:latin typeface="Courier New" panose="02070309020205020404" pitchFamily="49" charset="0"/>
+              <a:cs typeface="Courier New" panose="02070309020205020404" pitchFamily="49" charset="0"/>
+            </a:endParaRPr>
+          </a:p>
+          <a:p>
+            <a:pPr marL="0" indent="0">
+              <a:buFont typeface="Arial" panose="020B0604020202020204" pitchFamily="34" charset="0"/>
+              <a:buNone/>
+            </a:pPr>
+            <a:r>
+              <a:rPr lang="nl-NL" sz="1600" noProof="0">
                 <a:solidFill>
                   <a:schemeClr val="accent6">
                     <a:lumMod val="75000"/>
@@ -11909,41 +12009,29 @@
                 <a:latin typeface="Courier New" panose="02070309020205020404" pitchFamily="49" charset="0"/>
                 <a:cs typeface="Courier New" panose="02070309020205020404" pitchFamily="49" charset="0"/>
               </a:rPr>
-              <a:t>.</a:t>
-            </a:r>
-          </a:p>
-          <a:p>
-            <a:pPr marL="0" indent="0">
-              <a:buNone/>
-            </a:pPr>
-            <a:r>
-              <a:rPr lang="nl-NL" sz="1600" noProof="0" dirty="0">
-                <a:latin typeface="Courier New" panose="02070309020205020404" pitchFamily="49" charset="0"/>
-                <a:cs typeface="Courier New" panose="02070309020205020404" pitchFamily="49" charset="0"/>
-              </a:rPr>
-              <a:t>print(</a:t>
-            </a:r>
-            <a:r>
-              <a:rPr lang="nl-NL" sz="1600" noProof="0" dirty="0" err="1">
-                <a:latin typeface="Courier New" panose="02070309020205020404" pitchFamily="49" charset="0"/>
-                <a:cs typeface="Courier New" panose="02070309020205020404" pitchFamily="49" charset="0"/>
-              </a:rPr>
-              <a:t>result</a:t>
-            </a:r>
-            <a:r>
-              <a:rPr lang="nl-NL" sz="1600" noProof="0" dirty="0">
-                <a:latin typeface="Courier New" panose="02070309020205020404" pitchFamily="49" charset="0"/>
-                <a:cs typeface="Courier New" panose="02070309020205020404" pitchFamily="49" charset="0"/>
-              </a:rPr>
-              <a:t>)</a:t>
-            </a:r>
-          </a:p>
-          <a:p>
-            <a:pPr marL="0" indent="0">
-              <a:buNone/>
-            </a:pPr>
-            <a:r>
-              <a:rPr lang="nl-NL" sz="1600" dirty="0">
+              <a:t># Beschrijving via Cursor object.</a:t>
+            </a:r>
+          </a:p>
+          <a:p>
+            <a:pPr marL="0" indent="0">
+              <a:buFont typeface="Arial" panose="020B0604020202020204" pitchFamily="34" charset="0"/>
+              <a:buNone/>
+            </a:pPr>
+            <a:r>
+              <a:rPr lang="nl-NL" sz="1600">
+                <a:latin typeface="Courier New" panose="02070309020205020404" pitchFamily="49" charset="0"/>
+                <a:cs typeface="Courier New" panose="02070309020205020404" pitchFamily="49" charset="0"/>
+              </a:rPr>
+              <a:t>print(cursor.description)</a:t>
+            </a:r>
+          </a:p>
+          <a:p>
+            <a:pPr marL="0" indent="0">
+              <a:buFont typeface="Arial" panose="020B0604020202020204" pitchFamily="34" charset="0"/>
+              <a:buNone/>
+            </a:pPr>
+            <a:r>
+              <a:rPr lang="nl-NL" sz="1600">
                 <a:solidFill>
                   <a:schemeClr val="accent6">
                     <a:lumMod val="75000"/>
@@ -11952,30 +12040,16 @@
                 <a:latin typeface="Courier New" panose="02070309020205020404" pitchFamily="49" charset="0"/>
                 <a:cs typeface="Courier New" panose="02070309020205020404" pitchFamily="49" charset="0"/>
               </a:rPr>
-              <a:t># [(1, 'John', ' Doe')]</a:t>
-            </a:r>
-            <a:endParaRPr lang="nl-NL" sz="1600" noProof="0" dirty="0">
-              <a:latin typeface="Courier New" panose="02070309020205020404" pitchFamily="49" charset="0"/>
-              <a:cs typeface="Courier New" panose="02070309020205020404" pitchFamily="49" charset="0"/>
-            </a:endParaRPr>
+              <a:t># [('CustomerId', ..., None),</a:t>
+            </a:r>
           </a:p>
           <a:p>
             <a:pPr marL="0" indent="0">
               <a:buFont typeface="Arial" panose="020B0604020202020204" pitchFamily="34" charset="0"/>
               <a:buNone/>
             </a:pPr>
-            <a:endParaRPr lang="nl-NL" sz="1600" dirty="0">
-              <a:latin typeface="Courier New" panose="02070309020205020404" pitchFamily="49" charset="0"/>
-              <a:cs typeface="Courier New" panose="02070309020205020404" pitchFamily="49" charset="0"/>
-            </a:endParaRPr>
-          </a:p>
-          <a:p>
-            <a:pPr marL="0" indent="0">
-              <a:buFont typeface="Arial" panose="020B0604020202020204" pitchFamily="34" charset="0"/>
-              <a:buNone/>
-            </a:pPr>
-            <a:r>
-              <a:rPr lang="nl-NL" sz="1600" noProof="0" dirty="0">
+            <a:r>
+              <a:rPr lang="nl-NL" sz="1600">
                 <a:solidFill>
                   <a:schemeClr val="accent6">
                     <a:lumMod val="75000"/>
@@ -11984,43 +12058,15 @@
                 <a:latin typeface="Courier New" panose="02070309020205020404" pitchFamily="49" charset="0"/>
                 <a:cs typeface="Courier New" panose="02070309020205020404" pitchFamily="49" charset="0"/>
               </a:rPr>
-              <a:t># Beschrijving via Cursor object.</a:t>
-            </a:r>
-          </a:p>
-          <a:p>
-            <a:pPr marL="0" indent="0">
-              <a:buFont typeface="Arial" panose="020B0604020202020204" pitchFamily="34" charset="0"/>
-              <a:buNone/>
-            </a:pPr>
-            <a:r>
-              <a:rPr lang="nl-NL" sz="1600" dirty="0">
-                <a:latin typeface="Courier New" panose="02070309020205020404" pitchFamily="49" charset="0"/>
-                <a:cs typeface="Courier New" panose="02070309020205020404" pitchFamily="49" charset="0"/>
-              </a:rPr>
-              <a:t>print(</a:t>
-            </a:r>
-            <a:r>
-              <a:rPr lang="nl-NL" sz="1600" dirty="0" err="1">
-                <a:latin typeface="Courier New" panose="02070309020205020404" pitchFamily="49" charset="0"/>
-                <a:cs typeface="Courier New" panose="02070309020205020404" pitchFamily="49" charset="0"/>
-              </a:rPr>
-              <a:t>cursor.decription</a:t>
-            </a:r>
-            <a:r>
-              <a:rPr lang="nl-NL" sz="1600" dirty="0">
-                <a:latin typeface="Courier New" panose="02070309020205020404" pitchFamily="49" charset="0"/>
-                <a:cs typeface="Courier New" panose="02070309020205020404" pitchFamily="49" charset="0"/>
-              </a:rPr>
-              <a:t>)</a:t>
-            </a:r>
-          </a:p>
-          <a:p>
-            <a:pPr marL="0" indent="0">
-              <a:buFont typeface="Arial" panose="020B0604020202020204" pitchFamily="34" charset="0"/>
-              <a:buNone/>
-            </a:pPr>
-            <a:r>
-              <a:rPr lang="nl-NL" sz="1600" dirty="0">
+              <a:t>#  ('Name'      , ..., None),</a:t>
+            </a:r>
+          </a:p>
+          <a:p>
+            <a:pPr marL="0" indent="0">
+              <a:buNone/>
+            </a:pPr>
+            <a:r>
+              <a:rPr lang="nl-NL" sz="1600">
                 <a:solidFill>
                   <a:schemeClr val="accent6">
                     <a:lumMod val="75000"/>
@@ -12029,90 +12075,7 @@
                 <a:latin typeface="Courier New" panose="02070309020205020404" pitchFamily="49" charset="0"/>
                 <a:cs typeface="Courier New" panose="02070309020205020404" pitchFamily="49" charset="0"/>
               </a:rPr>
-              <a:t># [('</a:t>
-            </a:r>
-            <a:r>
-              <a:rPr lang="nl-NL" sz="1600" dirty="0" err="1">
-                <a:solidFill>
-                  <a:schemeClr val="accent6">
-                    <a:lumMod val="75000"/>
-                  </a:schemeClr>
-                </a:solidFill>
-                <a:latin typeface="Courier New" panose="02070309020205020404" pitchFamily="49" charset="0"/>
-                <a:cs typeface="Courier New" panose="02070309020205020404" pitchFamily="49" charset="0"/>
-              </a:rPr>
-              <a:t>CustomerId</a:t>
-            </a:r>
-            <a:r>
-              <a:rPr lang="nl-NL" sz="1600" dirty="0">
-                <a:solidFill>
-                  <a:schemeClr val="accent6">
-                    <a:lumMod val="75000"/>
-                  </a:schemeClr>
-                </a:solidFill>
-                <a:latin typeface="Courier New" panose="02070309020205020404" pitchFamily="49" charset="0"/>
-                <a:cs typeface="Courier New" panose="02070309020205020404" pitchFamily="49" charset="0"/>
-              </a:rPr>
-              <a:t>', ..., None),</a:t>
-            </a:r>
-          </a:p>
-          <a:p>
-            <a:pPr marL="0" indent="0">
-              <a:buFont typeface="Arial" panose="020B0604020202020204" pitchFamily="34" charset="0"/>
-              <a:buNone/>
-            </a:pPr>
-            <a:r>
-              <a:rPr lang="nl-NL" sz="1600" dirty="0">
-                <a:solidFill>
-                  <a:schemeClr val="accent6">
-                    <a:lumMod val="75000"/>
-                  </a:schemeClr>
-                </a:solidFill>
-                <a:latin typeface="Courier New" panose="02070309020205020404" pitchFamily="49" charset="0"/>
-                <a:cs typeface="Courier New" panose="02070309020205020404" pitchFamily="49" charset="0"/>
-              </a:rPr>
-              <a:t>#  ('Name'      , ..., None),</a:t>
-            </a:r>
-          </a:p>
-          <a:p>
-            <a:pPr marL="0" indent="0">
-              <a:buNone/>
-            </a:pPr>
-            <a:r>
-              <a:rPr lang="nl-NL" sz="1600" dirty="0">
-                <a:solidFill>
-                  <a:schemeClr val="accent6">
-                    <a:lumMod val="75000"/>
-                  </a:schemeClr>
-                </a:solidFill>
-                <a:latin typeface="Courier New" panose="02070309020205020404" pitchFamily="49" charset="0"/>
-                <a:cs typeface="Courier New" panose="02070309020205020404" pitchFamily="49" charset="0"/>
-              </a:rPr>
-              <a:t>#  ('</a:t>
-            </a:r>
-            <a:r>
-              <a:rPr lang="nl-NL" sz="1600" dirty="0" err="1">
-                <a:solidFill>
-                  <a:schemeClr val="accent6">
-                    <a:lumMod val="75000"/>
-                  </a:schemeClr>
-                </a:solidFill>
-                <a:latin typeface="Courier New" panose="02070309020205020404" pitchFamily="49" charset="0"/>
-                <a:cs typeface="Courier New" panose="02070309020205020404" pitchFamily="49" charset="0"/>
-              </a:rPr>
-              <a:t>Lastname</a:t>
-            </a:r>
-            <a:r>
-              <a:rPr lang="nl-NL" sz="1600" dirty="0">
-                <a:solidFill>
-                  <a:schemeClr val="accent6">
-                    <a:lumMod val="75000"/>
-                  </a:schemeClr>
-                </a:solidFill>
-                <a:latin typeface="Courier New" panose="02070309020205020404" pitchFamily="49" charset="0"/>
-                <a:cs typeface="Courier New" panose="02070309020205020404" pitchFamily="49" charset="0"/>
-              </a:rPr>
-              <a:t>'  , ..., None)]</a:t>
+              <a:t>#  ('Lastname'  , ..., None)]</a:t>
             </a:r>
             <a:endParaRPr lang="nl-NL" sz="1600" noProof="0" dirty="0">
               <a:solidFill>
@@ -15418,7 +15381,7 @@
                 <a:latin typeface="Courier New" panose="02070309020205020404" pitchFamily="49" charset="0"/>
                 <a:cs typeface="Courier New" panose="02070309020205020404" pitchFamily="49" charset="0"/>
               </a:rPr>
-              <a:t>, </a:t>
+              <a:t>,   </a:t>
             </a:r>
             <a:r>
               <a:rPr lang="nl-NL" sz="1800" dirty="0">
@@ -16827,11 +16790,11 @@
               <a:t>Welke data types heeft </a:t>
             </a:r>
             <a:r>
-              <a:rPr lang="nl-NL" sz="1800" dirty="0" err="1">
-                <a:latin typeface="Courier New" panose="02070309020205020404" pitchFamily="49" charset="0"/>
-                <a:cs typeface="Courier New" panose="02070309020205020404" pitchFamily="49" charset="0"/>
-              </a:rPr>
-              <a:t>GeboorteDatum</a:t>
+              <a:rPr lang="nl-NL" sz="1800" dirty="0">
+                <a:latin typeface="Courier New" panose="02070309020205020404" pitchFamily="49" charset="0"/>
+                <a:cs typeface="Courier New" panose="02070309020205020404" pitchFamily="49" charset="0"/>
+              </a:rPr>
+              <a:t>Geboortedatum</a:t>
             </a:r>
             <a:r>
               <a:rPr lang="nl-NL" sz="1800" dirty="0"/>
@@ -25904,8 +25867,12 @@
               <a:t>Stel: je wilt een takenlijst bijhouden in Python en maakt de volgende </a:t>
             </a:r>
             <a:r>
+              <a:rPr lang="nl-NL" sz="1800" dirty="0"/>
+              <a:t>c</a:t>
+            </a:r>
+            <a:r>
               <a:rPr lang="nl-NL" sz="1800" noProof="0" dirty="0" err="1"/>
-              <a:t>klasses</a:t>
+              <a:t>lasses</a:t>
             </a:r>
             <a:r>
               <a:rPr lang="nl-NL" sz="1800" noProof="0" dirty="0"/>
@@ -25924,7 +25891,7 @@
             </a:pPr>
             <a:r>
               <a:rPr lang="nl-NL" sz="1800" b="1" noProof="0" dirty="0" err="1"/>
-              <a:t>TaakLijst</a:t>
+              <a:t>TaskList</a:t>
             </a:r>
             <a:endParaRPr lang="nl-NL" sz="1800" noProof="0" dirty="0"/>
           </a:p>
@@ -25960,8 +25927,8 @@
               <a:buNone/>
             </a:pPr>
             <a:r>
-              <a:rPr lang="nl-NL" sz="1800" b="1" noProof="0" dirty="0"/>
-              <a:t>Taak</a:t>
+              <a:rPr lang="nl-NL" sz="1800" b="1" noProof="0" dirty="0" err="1"/>
+              <a:t>Task</a:t>
             </a:r>
             <a:endParaRPr lang="nl-NL" sz="1800" noProof="0" dirty="0"/>
           </a:p>
@@ -25972,30 +25939,6 @@
             <a:r>
               <a:rPr lang="nl-NL" sz="1800" dirty="0"/>
               <a:t>Een individuele taak met omschrijving en status.</a:t>
-            </a:r>
-          </a:p>
-          <a:p>
-            <a:pPr marL="0" indent="0">
-              <a:buNone/>
-            </a:pPr>
-            <a:endParaRPr lang="nl-NL" sz="1800" noProof="0" dirty="0"/>
-          </a:p>
-          <a:p>
-            <a:pPr marL="0" indent="0">
-              <a:buNone/>
-            </a:pPr>
-            <a:r>
-              <a:rPr lang="nl-NL" sz="1800" b="1" dirty="0"/>
-              <a:t>Status</a:t>
-            </a:r>
-          </a:p>
-          <a:p>
-            <a:pPr marL="0" indent="0">
-              <a:buNone/>
-            </a:pPr>
-            <a:r>
-              <a:rPr lang="nl-NL" sz="1800" noProof="0" dirty="0"/>
-              <a:t>Set standaardwaarden voor taak status.</a:t>
             </a:r>
           </a:p>
         </p:txBody>
@@ -26197,7 +26140,7 @@
               <a:buNone/>
             </a:pPr>
             <a:r>
-              <a:rPr lang="en-US" sz="1600" b="1" noProof="0">
+              <a:rPr lang="en-US" sz="1600" b="1" noProof="0" dirty="0">
                 <a:latin typeface="Courier New" panose="02070309020205020404" pitchFamily="49" charset="0"/>
                 <a:cs typeface="Courier New" panose="02070309020205020404" pitchFamily="49" charset="0"/>
               </a:rPr>
@@ -26259,46 +26202,6 @@
               <a:buFont typeface="Arial" panose="020B0604020202020204" pitchFamily="34" charset="0"/>
               <a:buNone/>
             </a:pPr>
-            <a:r>
-              <a:rPr lang="en-US" sz="1600" b="1" noProof="0" dirty="0">
-                <a:latin typeface="Courier New" panose="02070309020205020404" pitchFamily="49" charset="0"/>
-                <a:cs typeface="Courier New" panose="02070309020205020404" pitchFamily="49" charset="0"/>
-              </a:rPr>
-              <a:t>class Task:</a:t>
-            </a:r>
-          </a:p>
-          <a:p>
-            <a:pPr marL="0" indent="0">
-              <a:buFont typeface="Arial" panose="020B0604020202020204" pitchFamily="34" charset="0"/>
-              <a:buNone/>
-            </a:pPr>
-            <a:r>
-              <a:rPr lang="en-US" sz="1600" noProof="0" dirty="0">
-                <a:latin typeface="Courier New" panose="02070309020205020404" pitchFamily="49" charset="0"/>
-                <a:cs typeface="Courier New" panose="02070309020205020404" pitchFamily="49" charset="0"/>
-              </a:rPr>
-              <a:t>  description = None</a:t>
-            </a:r>
-          </a:p>
-          <a:p>
-            <a:pPr marL="0" indent="0">
-              <a:buFont typeface="Arial" panose="020B0604020202020204" pitchFamily="34" charset="0"/>
-              <a:buNone/>
-            </a:pPr>
-            <a:r>
-              <a:rPr lang="en-US" sz="1600" dirty="0">
-                <a:latin typeface="Courier New" panose="02070309020205020404" pitchFamily="49" charset="0"/>
-                <a:cs typeface="Courier New" panose="02070309020205020404" pitchFamily="49" charset="0"/>
-              </a:rPr>
-              <a:t>  state = </a:t>
-            </a:r>
-            <a:r>
-              <a:rPr lang="en-US" sz="1600" dirty="0" err="1">
-                <a:latin typeface="Courier New" panose="02070309020205020404" pitchFamily="49" charset="0"/>
-                <a:cs typeface="Courier New" panose="02070309020205020404" pitchFamily="49" charset="0"/>
-              </a:rPr>
-              <a:t>State.NEW</a:t>
-            </a:r>
             <a:endParaRPr lang="en-US" sz="1600" dirty="0">
               <a:latin typeface="Courier New" panose="02070309020205020404" pitchFamily="49" charset="0"/>
               <a:cs typeface="Courier New" panose="02070309020205020404" pitchFamily="49" charset="0"/>
@@ -26309,33 +26212,6 @@
               <a:buFont typeface="Arial" panose="020B0604020202020204" pitchFamily="34" charset="0"/>
               <a:buNone/>
             </a:pPr>
-            <a:r>
-              <a:rPr lang="en-US" sz="1600" dirty="0">
-                <a:latin typeface="Courier New" panose="02070309020205020404" pitchFamily="49" charset="0"/>
-                <a:cs typeface="Courier New" panose="02070309020205020404" pitchFamily="49" charset="0"/>
-              </a:rPr>
-              <a:t>  updated = </a:t>
-            </a:r>
-            <a:r>
-              <a:rPr lang="en-US" sz="1600" dirty="0" err="1">
-                <a:latin typeface="Courier New" panose="02070309020205020404" pitchFamily="49" charset="0"/>
-                <a:cs typeface="Courier New" panose="02070309020205020404" pitchFamily="49" charset="0"/>
-              </a:rPr>
-              <a:t>dt.datetime.now</a:t>
-            </a:r>
-            <a:r>
-              <a:rPr lang="en-US" sz="1600" dirty="0">
-                <a:latin typeface="Courier New" panose="02070309020205020404" pitchFamily="49" charset="0"/>
-                <a:cs typeface="Courier New" panose="02070309020205020404" pitchFamily="49" charset="0"/>
-              </a:rPr>
-              <a:t>()</a:t>
-            </a:r>
-          </a:p>
-          <a:p>
-            <a:pPr marL="0" indent="0">
-              <a:buFont typeface="Arial" panose="020B0604020202020204" pitchFamily="34" charset="0"/>
-              <a:buNone/>
-            </a:pPr>
             <a:endParaRPr lang="en-US" sz="1600" noProof="0" dirty="0">
               <a:latin typeface="Courier New" panose="02070309020205020404" pitchFamily="49" charset="0"/>
               <a:cs typeface="Courier New" panose="02070309020205020404" pitchFamily="49" charset="0"/>
@@ -26347,25 +26223,11 @@
               <a:buNone/>
             </a:pPr>
             <a:r>
-              <a:rPr lang="en-US" sz="1600" b="1" dirty="0">
-                <a:latin typeface="Courier New" panose="02070309020205020404" pitchFamily="49" charset="0"/>
-                <a:cs typeface="Courier New" panose="02070309020205020404" pitchFamily="49" charset="0"/>
-              </a:rPr>
-              <a:t>class State(</a:t>
-            </a:r>
-            <a:r>
-              <a:rPr lang="en-US" sz="1600" b="1" dirty="0" err="1">
-                <a:latin typeface="Courier New" panose="02070309020205020404" pitchFamily="49" charset="0"/>
-                <a:cs typeface="Courier New" panose="02070309020205020404" pitchFamily="49" charset="0"/>
-              </a:rPr>
-              <a:t>StrEnum</a:t>
-            </a:r>
-            <a:r>
-              <a:rPr lang="en-US" sz="1600" b="1" dirty="0">
-                <a:latin typeface="Courier New" panose="02070309020205020404" pitchFamily="49" charset="0"/>
-                <a:cs typeface="Courier New" panose="02070309020205020404" pitchFamily="49" charset="0"/>
-              </a:rPr>
-              <a:t>):</a:t>
+              <a:rPr lang="en-US" sz="1600" b="1" noProof="0" dirty="0">
+                <a:latin typeface="Courier New" panose="02070309020205020404" pitchFamily="49" charset="0"/>
+                <a:cs typeface="Courier New" panose="02070309020205020404" pitchFamily="49" charset="0"/>
+              </a:rPr>
+              <a:t>class Task:</a:t>
             </a:r>
           </a:p>
           <a:p>
@@ -26378,10 +26240,23 @@
                 <a:latin typeface="Courier New" panose="02070309020205020404" pitchFamily="49" charset="0"/>
                 <a:cs typeface="Courier New" panose="02070309020205020404" pitchFamily="49" charset="0"/>
               </a:rPr>
-              <a:t>  NEW = </a:t>
-            </a:r>
-            <a:r>
-              <a:rPr lang="en-US" sz="1600" noProof="0" dirty="0">
+              <a:t>  description = None</a:t>
+            </a:r>
+          </a:p>
+          <a:p>
+            <a:pPr marL="0" indent="0">
+              <a:buFont typeface="Arial" panose="020B0604020202020204" pitchFamily="34" charset="0"/>
+              <a:buNone/>
+            </a:pPr>
+            <a:r>
+              <a:rPr lang="en-US" sz="1600" dirty="0">
+                <a:latin typeface="Courier New" panose="02070309020205020404" pitchFamily="49" charset="0"/>
+                <a:cs typeface="Courier New" panose="02070309020205020404" pitchFamily="49" charset="0"/>
+              </a:rPr>
+              <a:t>  state = </a:t>
+            </a:r>
+            <a:r>
+              <a:rPr lang="en-US" sz="1600" dirty="0">
                 <a:solidFill>
                   <a:schemeClr val="accent2">
                     <a:lumMod val="75000"/>
@@ -26403,29 +26278,22 @@
                 <a:latin typeface="Courier New" panose="02070309020205020404" pitchFamily="49" charset="0"/>
                 <a:cs typeface="Courier New" panose="02070309020205020404" pitchFamily="49" charset="0"/>
               </a:rPr>
-              <a:t>  DONE = </a:t>
+              <a:t>  updated = </a:t>
+            </a:r>
+            <a:r>
+              <a:rPr lang="en-US" sz="1600" dirty="0" err="1">
+                <a:latin typeface="Courier New" panose="02070309020205020404" pitchFamily="49" charset="0"/>
+                <a:cs typeface="Courier New" panose="02070309020205020404" pitchFamily="49" charset="0"/>
+              </a:rPr>
+              <a:t>dt.datetime.now</a:t>
             </a:r>
             <a:r>
               <a:rPr lang="en-US" sz="1600" dirty="0">
-                <a:solidFill>
-                  <a:schemeClr val="accent2">
-                    <a:lumMod val="75000"/>
-                  </a:schemeClr>
-                </a:solidFill>
-                <a:latin typeface="Courier New" panose="02070309020205020404" pitchFamily="49" charset="0"/>
-                <a:cs typeface="Courier New" panose="02070309020205020404" pitchFamily="49" charset="0"/>
-              </a:rPr>
-              <a:t>"Done"</a:t>
-            </a:r>
-            <a:endParaRPr lang="en-US" sz="1600" noProof="0" dirty="0">
-              <a:solidFill>
-                <a:schemeClr val="accent2">
-                  <a:lumMod val="75000"/>
-                </a:schemeClr>
-              </a:solidFill>
-              <a:latin typeface="Courier New" panose="02070309020205020404" pitchFamily="49" charset="0"/>
-              <a:cs typeface="Courier New" panose="02070309020205020404" pitchFamily="49" charset="0"/>
-            </a:endParaRPr>
+                <a:latin typeface="Courier New" panose="02070309020205020404" pitchFamily="49" charset="0"/>
+                <a:cs typeface="Courier New" panose="02070309020205020404" pitchFamily="49" charset="0"/>
+              </a:rPr>
+              <a:t>()</a:t>
+            </a:r>
           </a:p>
         </p:txBody>
       </p:sp>
@@ -26630,30 +26498,7 @@
               <a:rPr lang="nl-NL" sz="1800" dirty="0"/>
               <a:t>Een individuele taak met omschrijving en status.</a:t>
             </a:r>
-          </a:p>
-          <a:p>
-            <a:pPr marL="0" indent="0">
-              <a:buNone/>
-            </a:pPr>
             <a:endParaRPr lang="nl-NL" sz="1800" noProof="0" dirty="0"/>
-          </a:p>
-          <a:p>
-            <a:pPr marL="0" indent="0">
-              <a:buNone/>
-            </a:pPr>
-            <a:r>
-              <a:rPr lang="nl-NL" sz="1800" b="1" dirty="0"/>
-              <a:t>State</a:t>
-            </a:r>
-          </a:p>
-          <a:p>
-            <a:pPr marL="0" indent="0">
-              <a:buNone/>
-            </a:pPr>
-            <a:r>
-              <a:rPr lang="nl-NL" sz="1800" noProof="0" dirty="0"/>
-              <a:t>Set standaardwaarden voor status taak.</a:t>
-            </a:r>
           </a:p>
         </p:txBody>
       </p:sp>
@@ -27131,11 +26976,16 @@
               <a:t>       state = </a:t>
             </a:r>
             <a:r>
-              <a:rPr lang="en-US" sz="1600" dirty="0" err="1">
-                <a:latin typeface="Courier New" panose="02070309020205020404" pitchFamily="49" charset="0"/>
-                <a:cs typeface="Courier New" panose="02070309020205020404" pitchFamily="49" charset="0"/>
-              </a:rPr>
-              <a:t>State.NEW</a:t>
+              <a:rPr lang="en-US" sz="1600" dirty="0">
+                <a:solidFill>
+                  <a:schemeClr val="accent2">
+                    <a:lumMod val="75000"/>
+                  </a:schemeClr>
+                </a:solidFill>
+                <a:latin typeface="Courier New" panose="02070309020205020404" pitchFamily="49" charset="0"/>
+                <a:cs typeface="Courier New" panose="02070309020205020404" pitchFamily="49" charset="0"/>
+              </a:rPr>
+              <a:t>"New"</a:t>
             </a:r>
             <a:r>
               <a:rPr lang="en-US" sz="1600" dirty="0">
@@ -27928,11 +27778,16 @@
               <a:t>       state = </a:t>
             </a:r>
             <a:r>
-              <a:rPr lang="nl-NL" sz="1600" dirty="0" err="1">
-                <a:latin typeface="Courier New" panose="02070309020205020404" pitchFamily="49" charset="0"/>
-                <a:cs typeface="Courier New" panose="02070309020205020404" pitchFamily="49" charset="0"/>
-              </a:rPr>
-              <a:t>State.NEW</a:t>
+              <a:rPr lang="nl-NL" sz="1600" dirty="0">
+                <a:solidFill>
+                  <a:schemeClr val="accent2">
+                    <a:lumMod val="75000"/>
+                  </a:schemeClr>
+                </a:solidFill>
+                <a:latin typeface="Courier New" panose="02070309020205020404" pitchFamily="49" charset="0"/>
+                <a:cs typeface="Courier New" panose="02070309020205020404" pitchFamily="49" charset="0"/>
+              </a:rPr>
+              <a:t>"New"</a:t>
             </a:r>
             <a:r>
               <a:rPr lang="nl-NL" sz="1600" dirty="0">
@@ -28058,13 +27913,13 @@
           <p:nvPr>
             <p:extLst>
               <p:ext uri="{D42A27DB-BD31-4B8C-83A1-F6EECF244321}">
-                <p14:modId xmlns:p14="http://schemas.microsoft.com/office/powerpoint/2010/main" val="3827686035"/>
+                <p14:modId xmlns:p14="http://schemas.microsoft.com/office/powerpoint/2010/main" val="3944945171"/>
               </p:ext>
             </p:extLst>
           </p:nvPr>
         </p:nvGraphicFramePr>
         <p:xfrm>
-          <a:off x="6313984" y="1690688"/>
+          <a:off x="6337490" y="2267888"/>
           <a:ext cx="3447198" cy="741680"/>
         </p:xfrm>
         <a:graphic>
@@ -28194,13 +28049,13 @@
           <p:nvPr>
             <p:extLst>
               <p:ext uri="{D42A27DB-BD31-4B8C-83A1-F6EECF244321}">
-                <p14:modId xmlns:p14="http://schemas.microsoft.com/office/powerpoint/2010/main" val="2496899139"/>
+                <p14:modId xmlns:p14="http://schemas.microsoft.com/office/powerpoint/2010/main" val="3401733"/>
               </p:ext>
             </p:extLst>
           </p:nvPr>
         </p:nvGraphicFramePr>
         <p:xfrm>
-          <a:off x="6313984" y="3168862"/>
+          <a:off x="6325737" y="4181159"/>
           <a:ext cx="5039816" cy="1112520"/>
         </p:xfrm>
         <a:graphic>
@@ -28374,7 +28229,7 @@
                           <a:latin typeface="Courier New" panose="02070309020205020404" pitchFamily="49" charset="0"/>
                           <a:cs typeface="Courier New" panose="02070309020205020404" pitchFamily="49" charset="0"/>
                         </a:rPr>
-                        <a:t>1</a:t>
+                        <a:t>New</a:t>
                       </a:r>
                     </a:p>
                   </a:txBody>
@@ -28461,7 +28316,7 @@
                           <a:latin typeface="Courier New" panose="02070309020205020404" pitchFamily="49" charset="0"/>
                           <a:cs typeface="Courier New" panose="02070309020205020404" pitchFamily="49" charset="0"/>
                         </a:rPr>
-                        <a:t>1</a:t>
+                        <a:t>New</a:t>
                       </a:r>
                     </a:p>
                   </a:txBody>
@@ -28510,290 +28365,6 @@
           </a:graphicData>
         </a:graphic>
       </p:graphicFrame>
-      <p:graphicFrame>
-        <p:nvGraphicFramePr>
-          <p:cNvPr id="10" name="Table 9">
-            <a:extLst>
-              <a:ext uri="{FF2B5EF4-FFF2-40B4-BE49-F238E27FC236}">
-                <a16:creationId xmlns:a16="http://schemas.microsoft.com/office/drawing/2014/main" id="{952C1760-1845-31DA-DD92-5313E3BB6912}"/>
-              </a:ext>
-            </a:extLst>
-          </p:cNvPr>
-          <p:cNvGraphicFramePr>
-            <a:graphicFrameLocks noGrp="1"/>
-          </p:cNvGraphicFramePr>
-          <p:nvPr>
-            <p:extLst>
-              <p:ext uri="{D42A27DB-BD31-4B8C-83A1-F6EECF244321}">
-                <p14:modId xmlns:p14="http://schemas.microsoft.com/office/powerpoint/2010/main" val="2181988910"/>
-              </p:ext>
-            </p:extLst>
-          </p:nvPr>
-        </p:nvGraphicFramePr>
-        <p:xfrm>
-          <a:off x="6313985" y="5017876"/>
-          <a:ext cx="2023565" cy="1112520"/>
-        </p:xfrm>
-        <a:graphic>
-          <a:graphicData uri="http://schemas.openxmlformats.org/drawingml/2006/table">
-            <a:tbl>
-              <a:tblPr firstRow="1" bandRow="1">
-                <a:tableStyleId>{5C22544A-7EE6-4342-B048-85BDC9FD1C3A}</a:tableStyleId>
-              </a:tblPr>
-              <a:tblGrid>
-                <a:gridCol w="887709">
-                  <a:extLst>
-                    <a:ext uri="{9D8B030D-6E8A-4147-A177-3AD203B41FA5}">
-                      <a16:colId xmlns:a16="http://schemas.microsoft.com/office/drawing/2014/main" val="2708213738"/>
-                    </a:ext>
-                  </a:extLst>
-                </a:gridCol>
-                <a:gridCol w="1135856">
-                  <a:extLst>
-                    <a:ext uri="{9D8B030D-6E8A-4147-A177-3AD203B41FA5}">
-                      <a16:colId xmlns:a16="http://schemas.microsoft.com/office/drawing/2014/main" val="3298213058"/>
-                    </a:ext>
-                  </a:extLst>
-                </a:gridCol>
-              </a:tblGrid>
-              <a:tr h="370840">
-                <a:tc>
-                  <a:txBody>
-                    <a:bodyPr/>
-                    <a:lstStyle/>
-                    <a:p>
-                      <a:pPr algn="ctr"/>
-                      <a:r>
-                        <a:rPr lang="nl-NL" sz="1400" dirty="0" err="1"/>
-                        <a:t>StateId</a:t>
-                      </a:r>
-                      <a:endParaRPr lang="nl-NL" sz="1400" dirty="0"/>
-                    </a:p>
-                  </a:txBody>
-                  <a:tcPr/>
-                </a:tc>
-                <a:tc>
-                  <a:txBody>
-                    <a:bodyPr/>
-                    <a:lstStyle/>
-                    <a:p>
-                      <a:r>
-                        <a:rPr lang="nl-NL" sz="1400" dirty="0"/>
-                        <a:t>State</a:t>
-                      </a:r>
-                    </a:p>
-                  </a:txBody>
-                  <a:tcPr/>
-                </a:tc>
-                <a:extLst>
-                  <a:ext uri="{0D108BD9-81ED-4DB2-BD59-A6C34878D82A}">
-                    <a16:rowId xmlns:a16="http://schemas.microsoft.com/office/drawing/2014/main" val="3151280356"/>
-                  </a:ext>
-                </a:extLst>
-              </a:tr>
-              <a:tr h="370840">
-                <a:tc>
-                  <a:txBody>
-                    <a:bodyPr/>
-                    <a:lstStyle/>
-                    <a:p>
-                      <a:pPr algn="ctr"/>
-                      <a:r>
-                        <a:rPr lang="nl-NL" sz="1400" dirty="0"/>
-                        <a:t>1</a:t>
-                      </a:r>
-                    </a:p>
-                  </a:txBody>
-                  <a:tcPr anchor="ctr"/>
-                </a:tc>
-                <a:tc>
-                  <a:txBody>
-                    <a:bodyPr/>
-                    <a:lstStyle/>
-                    <a:p>
-                      <a:r>
-                        <a:rPr lang="nl-NL" sz="1400" dirty="0"/>
-                        <a:t>New</a:t>
-                      </a:r>
-                    </a:p>
-                  </a:txBody>
-                  <a:tcPr anchor="ctr"/>
-                </a:tc>
-                <a:extLst>
-                  <a:ext uri="{0D108BD9-81ED-4DB2-BD59-A6C34878D82A}">
-                    <a16:rowId xmlns:a16="http://schemas.microsoft.com/office/drawing/2014/main" val="4009411874"/>
-                  </a:ext>
-                </a:extLst>
-              </a:tr>
-              <a:tr h="370840">
-                <a:tc>
-                  <a:txBody>
-                    <a:bodyPr/>
-                    <a:lstStyle/>
-                    <a:p>
-                      <a:pPr algn="ctr"/>
-                      <a:r>
-                        <a:rPr lang="nl-NL" sz="1400" dirty="0"/>
-                        <a:t>2</a:t>
-                      </a:r>
-                    </a:p>
-                  </a:txBody>
-                  <a:tcPr anchor="ctr"/>
-                </a:tc>
-                <a:tc>
-                  <a:txBody>
-                    <a:bodyPr/>
-                    <a:lstStyle/>
-                    <a:p>
-                      <a:r>
-                        <a:rPr lang="nl-NL" sz="1400" dirty="0" err="1"/>
-                        <a:t>Done</a:t>
-                      </a:r>
-                      <a:endParaRPr lang="nl-NL" sz="1400" dirty="0"/>
-                    </a:p>
-                  </a:txBody>
-                  <a:tcPr anchor="ctr"/>
-                </a:tc>
-                <a:extLst>
-                  <a:ext uri="{0D108BD9-81ED-4DB2-BD59-A6C34878D82A}">
-                    <a16:rowId xmlns:a16="http://schemas.microsoft.com/office/drawing/2014/main" val="1551953923"/>
-                  </a:ext>
-                </a:extLst>
-              </a:tr>
-            </a:tbl>
-          </a:graphicData>
-        </a:graphic>
-      </p:graphicFrame>
-      <p:cxnSp>
-        <p:nvCxnSpPr>
-          <p:cNvPr id="12" name="Connector: Elbow 11">
-            <a:extLst>
-              <a:ext uri="{FF2B5EF4-FFF2-40B4-BE49-F238E27FC236}">
-                <a16:creationId xmlns:a16="http://schemas.microsoft.com/office/drawing/2014/main" id="{8B92ABA8-7B70-42B3-568B-C9678587DCA8}"/>
-              </a:ext>
-            </a:extLst>
-          </p:cNvPr>
-          <p:cNvCxnSpPr>
-            <a:cxnSpLocks/>
-          </p:cNvCxnSpPr>
-          <p:nvPr/>
-        </p:nvCxnSpPr>
-        <p:spPr>
-          <a:xfrm flipV="1">
-            <a:off x="2169994" y="2245057"/>
-            <a:ext cx="4155743" cy="1183943"/>
-          </a:xfrm>
-          <a:prstGeom prst="bentConnector3">
-            <a:avLst>
-              <a:gd name="adj1" fmla="val 78571"/>
-            </a:avLst>
-          </a:prstGeom>
-          <a:ln>
-            <a:tailEnd type="triangle"/>
-          </a:ln>
-        </p:spPr>
-        <p:style>
-          <a:lnRef idx="2">
-            <a:schemeClr val="dk1"/>
-          </a:lnRef>
-          <a:fillRef idx="0">
-            <a:schemeClr val="dk1"/>
-          </a:fillRef>
-          <a:effectRef idx="1">
-            <a:schemeClr val="dk1"/>
-          </a:effectRef>
-          <a:fontRef idx="minor">
-            <a:schemeClr val="tx1"/>
-          </a:fontRef>
-        </p:style>
-      </p:cxnSp>
-      <p:cxnSp>
-        <p:nvCxnSpPr>
-          <p:cNvPr id="15" name="Connector: Elbow 14">
-            <a:extLst>
-              <a:ext uri="{FF2B5EF4-FFF2-40B4-BE49-F238E27FC236}">
-                <a16:creationId xmlns:a16="http://schemas.microsoft.com/office/drawing/2014/main" id="{719B4697-4FFC-1109-8E12-5676ABDEC5B5}"/>
-              </a:ext>
-            </a:extLst>
-          </p:cNvPr>
-          <p:cNvCxnSpPr>
-            <a:cxnSpLocks/>
-            <a:endCxn id="9" idx="1"/>
-          </p:cNvCxnSpPr>
-          <p:nvPr/>
-        </p:nvCxnSpPr>
-        <p:spPr>
-          <a:xfrm flipV="1">
-            <a:off x="1869743" y="3725122"/>
-            <a:ext cx="4444241" cy="498860"/>
-          </a:xfrm>
-          <a:prstGeom prst="bentConnector3">
-            <a:avLst>
-              <a:gd name="adj1" fmla="val 80095"/>
-            </a:avLst>
-          </a:prstGeom>
-          <a:ln>
-            <a:tailEnd type="triangle"/>
-          </a:ln>
-        </p:spPr>
-        <p:style>
-          <a:lnRef idx="2">
-            <a:schemeClr val="dk1"/>
-          </a:lnRef>
-          <a:fillRef idx="0">
-            <a:schemeClr val="dk1"/>
-          </a:fillRef>
-          <a:effectRef idx="1">
-            <a:schemeClr val="dk1"/>
-          </a:effectRef>
-          <a:fontRef idx="minor">
-            <a:schemeClr val="tx1"/>
-          </a:fontRef>
-        </p:style>
-      </p:cxnSp>
-      <p:cxnSp>
-        <p:nvCxnSpPr>
-          <p:cNvPr id="23" name="Connector: Elbow 22">
-            <a:extLst>
-              <a:ext uri="{FF2B5EF4-FFF2-40B4-BE49-F238E27FC236}">
-                <a16:creationId xmlns:a16="http://schemas.microsoft.com/office/drawing/2014/main" id="{AE7E4233-6BC2-FBC6-EC42-65F16CD2DFFF}"/>
-              </a:ext>
-            </a:extLst>
-          </p:cNvPr>
-          <p:cNvCxnSpPr>
-            <a:endCxn id="10" idx="1"/>
-          </p:cNvCxnSpPr>
-          <p:nvPr/>
-        </p:nvCxnSpPr>
-        <p:spPr>
-          <a:xfrm>
-            <a:off x="3330054" y="4728949"/>
-            <a:ext cx="2983931" cy="845187"/>
-          </a:xfrm>
-          <a:prstGeom prst="bentConnector3">
-            <a:avLst>
-              <a:gd name="adj1" fmla="val 70582"/>
-            </a:avLst>
-          </a:prstGeom>
-          <a:ln>
-            <a:tailEnd type="triangle"/>
-          </a:ln>
-        </p:spPr>
-        <p:style>
-          <a:lnRef idx="2">
-            <a:schemeClr val="dk1"/>
-          </a:lnRef>
-          <a:fillRef idx="0">
-            <a:schemeClr val="dk1"/>
-          </a:fillRef>
-          <a:effectRef idx="1">
-            <a:schemeClr val="dk1"/>
-          </a:effectRef>
-          <a:fontRef idx="minor">
-            <a:schemeClr val="tx1"/>
-          </a:fontRef>
-        </p:style>
-      </p:cxnSp>
       <p:sp>
         <p:nvSpPr>
           <p:cNvPr id="25" name="TextBox 24">
@@ -28808,7 +28379,7 @@
         </p:nvSpPr>
         <p:spPr>
           <a:xfrm>
-            <a:off x="6313984" y="1351137"/>
+            <a:off x="6337490" y="1928337"/>
             <a:ext cx="898900" cy="338554"/>
           </a:xfrm>
           <a:prstGeom prst="rect">
@@ -28844,7 +28415,7 @@
         </p:nvSpPr>
         <p:spPr>
           <a:xfrm>
-            <a:off x="6325737" y="2836135"/>
+            <a:off x="6337490" y="3848432"/>
             <a:ext cx="617157" cy="338554"/>
           </a:xfrm>
           <a:prstGeom prst="rect">
@@ -28866,42 +28437,92 @@
           </a:p>
         </p:txBody>
       </p:sp>
-      <p:sp>
-        <p:nvSpPr>
-          <p:cNvPr id="27" name="TextBox 26">
+      <p:cxnSp>
+        <p:nvCxnSpPr>
+          <p:cNvPr id="5" name="Connector: Elbow 4">
             <a:extLst>
               <a:ext uri="{FF2B5EF4-FFF2-40B4-BE49-F238E27FC236}">
-                <a16:creationId xmlns:a16="http://schemas.microsoft.com/office/drawing/2014/main" id="{A8858C46-F50D-63FD-0893-F98FC1469CE2}"/>
+                <a16:creationId xmlns:a16="http://schemas.microsoft.com/office/drawing/2014/main" id="{42678370-DA4A-8767-DC91-1A0E8F49B141}"/>
               </a:ext>
             </a:extLst>
           </p:cNvPr>
-          <p:cNvSpPr txBox="1"/>
+          <p:cNvCxnSpPr>
+            <a:cxnSpLocks/>
+          </p:cNvCxnSpPr>
           <p:nvPr/>
-        </p:nvSpPr>
+        </p:nvCxnSpPr>
+        <p:spPr>
+          <a:xfrm flipV="1">
+            <a:off x="2187385" y="2665622"/>
+            <a:ext cx="4033561" cy="790272"/>
+          </a:xfrm>
+          <a:prstGeom prst="bentConnector3">
+            <a:avLst>
+              <a:gd name="adj1" fmla="val 74003"/>
+            </a:avLst>
+          </a:prstGeom>
+          <a:ln>
+            <a:tailEnd type="triangle"/>
+          </a:ln>
+        </p:spPr>
+        <p:style>
+          <a:lnRef idx="3">
+            <a:schemeClr val="dk1"/>
+          </a:lnRef>
+          <a:fillRef idx="0">
+            <a:schemeClr val="dk1"/>
+          </a:fillRef>
+          <a:effectRef idx="2">
+            <a:schemeClr val="dk1"/>
+          </a:effectRef>
+          <a:fontRef idx="minor">
+            <a:schemeClr val="tx1"/>
+          </a:fontRef>
+        </p:style>
+      </p:cxnSp>
+      <p:cxnSp>
+        <p:nvCxnSpPr>
+          <p:cNvPr id="7" name="Connector: Elbow 6">
+            <a:extLst>
+              <a:ext uri="{FF2B5EF4-FFF2-40B4-BE49-F238E27FC236}">
+                <a16:creationId xmlns:a16="http://schemas.microsoft.com/office/drawing/2014/main" id="{B72FEA6E-2C91-B004-F16F-3DBE1DE2A29E}"/>
+              </a:ext>
+            </a:extLst>
+          </p:cNvPr>
+          <p:cNvCxnSpPr>
+            <a:cxnSpLocks/>
+          </p:cNvCxnSpPr>
+          <p:nvPr/>
+        </p:nvCxnSpPr>
         <p:spPr>
           <a:xfrm>
-            <a:off x="6313984" y="4683664"/>
-            <a:ext cx="691023" cy="338554"/>
+            <a:off x="2268071" y="4181159"/>
+            <a:ext cx="3950088" cy="556260"/>
           </a:xfrm>
-          <a:prstGeom prst="rect">
-            <a:avLst/>
+          <a:prstGeom prst="bentConnector3">
+            <a:avLst>
+              <a:gd name="adj1" fmla="val 73603"/>
+            </a:avLst>
           </a:prstGeom>
-          <a:noFill/>
+          <a:ln>
+            <a:tailEnd type="triangle"/>
+          </a:ln>
         </p:spPr>
-        <p:txBody>
-          <a:bodyPr wrap="none" rtlCol="0">
-            <a:spAutoFit/>
-          </a:bodyPr>
-          <a:lstStyle/>
-          <a:p>
-            <a:r>
-              <a:rPr lang="nl-NL" sz="1600" dirty="0" err="1"/>
-              <a:t>States</a:t>
-            </a:r>
-            <a:endParaRPr lang="nl-NL" sz="1600" dirty="0"/>
-          </a:p>
-        </p:txBody>
-      </p:sp>
+        <p:style>
+          <a:lnRef idx="3">
+            <a:schemeClr val="dk1"/>
+          </a:lnRef>
+          <a:fillRef idx="0">
+            <a:schemeClr val="dk1"/>
+          </a:fillRef>
+          <a:effectRef idx="2">
+            <a:schemeClr val="dk1"/>
+          </a:effectRef>
+          <a:fontRef idx="minor">
+            <a:schemeClr val="tx1"/>
+          </a:fontRef>
+        </p:style>
+      </p:cxnSp>
     </p:spTree>
     <p:extLst>
       <p:ext uri="{BB962C8B-B14F-4D97-AF65-F5344CB8AC3E}">
@@ -29076,8 +28697,8 @@
         </p:nvSpPr>
         <p:spPr>
           <a:xfrm>
-            <a:off x="838200" y="1825625"/>
-            <a:ext cx="4749800" cy="4351338"/>
+            <a:off x="838199" y="1825625"/>
+            <a:ext cx="5257797" cy="4351338"/>
           </a:xfrm>
           <a:prstGeom prst="rect">
             <a:avLst/>
@@ -29431,6 +29052,20 @@
                 <a:cs typeface="Courier New" panose="02070309020205020404" pitchFamily="49" charset="0"/>
               </a:rPr>
               <a:t>(</a:t>
+            </a:r>
+            <a:r>
+              <a:rPr lang="nl-NL" sz="1600" dirty="0" err="1">
+                <a:latin typeface="Courier New" panose="02070309020205020404" pitchFamily="49" charset="0"/>
+                <a:cs typeface="Courier New" panose="02070309020205020404" pitchFamily="49" charset="0"/>
+              </a:rPr>
+              <a:t>description</a:t>
+            </a:r>
+            <a:r>
+              <a:rPr lang="nl-NL" sz="1600" dirty="0">
+                <a:latin typeface="Courier New" panose="02070309020205020404" pitchFamily="49" charset="0"/>
+                <a:cs typeface="Courier New" panose="02070309020205020404" pitchFamily="49" charset="0"/>
+              </a:rPr>
+              <a:t>=</a:t>
             </a:r>
             <a:r>
               <a:rPr lang="nl-NL" sz="1600" dirty="0" err="1">
@@ -30250,19 +29885,20 @@
                 <a:latin typeface="Courier New" panose="02070309020205020404" pitchFamily="49" charset="0"/>
                 <a:cs typeface="Courier New" panose="02070309020205020404" pitchFamily="49" charset="0"/>
               </a:rPr>
-              <a:t>: State = </a:t>
-            </a:r>
-            <a:r>
-              <a:rPr lang="en-US" sz="1400" dirty="0" err="1">
-                <a:latin typeface="Courier New" panose="02070309020205020404" pitchFamily="49" charset="0"/>
-                <a:cs typeface="Courier New" panose="02070309020205020404" pitchFamily="49" charset="0"/>
-              </a:rPr>
-              <a:t>State.NEW</a:t>
-            </a:r>
-            <a:endParaRPr lang="en-US" sz="1400" dirty="0">
-              <a:latin typeface="Courier New" panose="02070309020205020404" pitchFamily="49" charset="0"/>
-              <a:cs typeface="Courier New" panose="02070309020205020404" pitchFamily="49" charset="0"/>
-            </a:endParaRPr>
+              <a:t>: str = </a:t>
+            </a:r>
+            <a:r>
+              <a:rPr lang="en-US" sz="1400" dirty="0">
+                <a:solidFill>
+                  <a:schemeClr val="accent2">
+                    <a:lumMod val="75000"/>
+                  </a:schemeClr>
+                </a:solidFill>
+                <a:latin typeface="Courier New" panose="02070309020205020404" pitchFamily="49" charset="0"/>
+                <a:cs typeface="Courier New" panose="02070309020205020404" pitchFamily="49" charset="0"/>
+              </a:rPr>
+              <a:t>"New"</a:t>
+            </a:r>
           </a:p>
           <a:p>
             <a:pPr marL="0" indent="0">
@@ -30521,7 +30157,19 @@
                 <a:latin typeface="Courier New" panose="02070309020205020404" pitchFamily="49" charset="0"/>
                 <a:cs typeface="Courier New" panose="02070309020205020404" pitchFamily="49" charset="0"/>
               </a:rPr>
-              <a:t>=True</a:t>
+              <a:t>=</a:t>
+            </a:r>
+            <a:r>
+              <a:rPr lang="nl-NL" sz="1800" dirty="0">
+                <a:solidFill>
+                  <a:schemeClr val="accent5">
+                    <a:lumMod val="75000"/>
+                  </a:schemeClr>
+                </a:solidFill>
+                <a:latin typeface="Courier New" panose="02070309020205020404" pitchFamily="49" charset="0"/>
+                <a:cs typeface="Courier New" panose="02070309020205020404" pitchFamily="49" charset="0"/>
+              </a:rPr>
+              <a:t>True</a:t>
             </a:r>
             <a:r>
               <a:rPr lang="nl-NL" sz="1800" dirty="0"/>
@@ -31591,7 +31239,7 @@
                 <a:latin typeface="Courier New" panose="02070309020205020404" pitchFamily="49" charset="0"/>
                 <a:cs typeface="Courier New" panose="02070309020205020404" pitchFamily="49" charset="0"/>
               </a:rPr>
-              <a:t> = Task(</a:t>
+              <a:t> = Task(description=</a:t>
             </a:r>
             <a:r>
               <a:rPr lang="en-US" sz="1400" noProof="0" dirty="0">
@@ -32183,7 +31831,7 @@
                 <a:latin typeface="Courier New" panose="02070309020205020404" pitchFamily="49" charset="0"/>
                 <a:cs typeface="Courier New" panose="02070309020205020404" pitchFamily="49" charset="0"/>
               </a:rPr>
-              <a:t> = Task(</a:t>
+              <a:t> = Task(description=</a:t>
             </a:r>
             <a:r>
               <a:rPr lang="en-US" sz="1400" noProof="0" dirty="0">
@@ -33069,7 +32717,7 @@
                 <a:latin typeface="Courier New" panose="02070309020205020404" pitchFamily="49" charset="0"/>
                 <a:cs typeface="Courier New" panose="02070309020205020404" pitchFamily="49" charset="0"/>
               </a:rPr>
-              <a:t>Task.State</a:t>
+              <a:t>Task.state</a:t>
             </a:r>
             <a:r>
               <a:rPr lang="en-US" sz="1400" dirty="0">
@@ -33384,27 +33032,19 @@
               <a:rPr lang="nl-NL" sz="1600" noProof="0" dirty="0">
                 <a:cs typeface="Courier New" panose="02070309020205020404" pitchFamily="49" charset="0"/>
               </a:rPr>
-              <a:t>		Een </a:t>
+              <a:t>		Een tekstveld, standaard </a:t>
             </a:r>
             <a:r>
               <a:rPr lang="nl-NL" sz="1600" noProof="0" dirty="0">
-                <a:latin typeface="Courier New" panose="02070309020205020404" pitchFamily="49" charset="0"/>
-                <a:cs typeface="Courier New" panose="02070309020205020404" pitchFamily="49" charset="0"/>
-              </a:rPr>
-              <a:t>State</a:t>
-            </a:r>
-            <a:r>
-              <a:rPr lang="nl-NL" sz="1600" noProof="0" dirty="0">
-                <a:cs typeface="Courier New" panose="02070309020205020404" pitchFamily="49" charset="0"/>
-              </a:rPr>
-              <a:t>, standaard </a:t>
-            </a:r>
-            <a:r>
-              <a:rPr lang="nl-NL" sz="1600" noProof="0" dirty="0" err="1">
-                <a:latin typeface="Courier New" panose="02070309020205020404" pitchFamily="49" charset="0"/>
-                <a:cs typeface="Courier New" panose="02070309020205020404" pitchFamily="49" charset="0"/>
-              </a:rPr>
-              <a:t>State.NEW</a:t>
+                <a:solidFill>
+                  <a:schemeClr val="accent2">
+                    <a:lumMod val="75000"/>
+                  </a:schemeClr>
+                </a:solidFill>
+                <a:latin typeface="Courier New" panose="02070309020205020404" pitchFamily="49" charset="0"/>
+                <a:cs typeface="Courier New" panose="02070309020205020404" pitchFamily="49" charset="0"/>
+              </a:rPr>
+              <a:t>"New"</a:t>
             </a:r>
             <a:r>
               <a:rPr lang="nl-NL" sz="1600" noProof="0" dirty="0">
@@ -35703,6 +35343,11 @@
             </a:r>
             <a:r>
               <a:rPr lang="en-US" sz="1200" b="1" noProof="0" dirty="0">
+                <a:solidFill>
+                  <a:schemeClr val="accent2">
+                    <a:lumMod val="75000"/>
+                  </a:schemeClr>
+                </a:solidFill>
                 <a:latin typeface="Courier New" panose="02070309020205020404" pitchFamily="49" charset="0"/>
                 <a:cs typeface="Courier New" panose="02070309020205020404" pitchFamily="49" charset="0"/>
               </a:rPr>
@@ -36619,6 +36264,11 @@
             </a:r>
             <a:r>
               <a:rPr lang="en-US" sz="1200" b="1" noProof="0" dirty="0">
+                <a:solidFill>
+                  <a:schemeClr val="accent2">
+                    <a:lumMod val="75000"/>
+                  </a:schemeClr>
+                </a:solidFill>
                 <a:latin typeface="Courier New" panose="02070309020205020404" pitchFamily="49" charset="0"/>
                 <a:cs typeface="Courier New" panose="02070309020205020404" pitchFamily="49" charset="0"/>
               </a:rPr>
@@ -36626,6 +36276,11 @@
             </a:r>
             <a:r>
               <a:rPr lang="en-US" sz="1200" noProof="0" dirty="0">
+                <a:solidFill>
+                  <a:schemeClr val="accent2">
+                    <a:lumMod val="75000"/>
+                  </a:schemeClr>
+                </a:solidFill>
                 <a:latin typeface="Courier New" panose="02070309020205020404" pitchFamily="49" charset="0"/>
                 <a:cs typeface="Courier New" panose="02070309020205020404" pitchFamily="49" charset="0"/>
               </a:rPr>
@@ -36633,6 +36288,11 @@
             </a:r>
             <a:r>
               <a:rPr lang="en-US" sz="1200" b="1" noProof="0" dirty="0">
+                <a:solidFill>
+                  <a:schemeClr val="accent2">
+                    <a:lumMod val="75000"/>
+                  </a:schemeClr>
+                </a:solidFill>
                 <a:latin typeface="Courier New" panose="02070309020205020404" pitchFamily="49" charset="0"/>
                 <a:cs typeface="Courier New" panose="02070309020205020404" pitchFamily="49" charset="0"/>
               </a:rPr>
@@ -37129,9 +36789,10 @@
           <a:lstStyle/>
           <a:p>
             <a:r>
-              <a:rPr lang="nl-NL" sz="3600" noProof="0" dirty="0"/>
-              <a:t>Oefeningen 5</a:t>
-            </a:r>
+              <a:rPr lang="nl-NL" sz="3600" noProof="0"/>
+              <a:t>Oefeningen 6</a:t>
+            </a:r>
+            <a:endParaRPr lang="nl-NL" sz="3600" noProof="0" dirty="0"/>
           </a:p>
         </p:txBody>
       </p:sp>

</xml_diff>